<commit_message>
initial update of presentation
</commit_message>
<xml_diff>
--- a/docs/W-9 Working Document/W-9.3 Presentation Slides/Phase 3/vms_presentation_3_v0.1.pptx
+++ b/docs/W-9 Working Document/W-9.3 Presentation Slides/Phase 3/vms_presentation_3_v0.1.pptx
@@ -3277,7 +3277,14 @@
               <a:ln/>
               <a:effectLst/>
             </a:rPr>
-            <a:t>Staff Management</a:t>
+            <a:t>Certificate </a:t>
+          </a:r>
+          <a:r>
+            <a:rPr lang="en-US" sz="1600" b="1" cap="none" spc="0" dirty="0" smtClean="0">
+              <a:ln/>
+              <a:effectLst/>
+            </a:rPr>
+            <a:t>Management</a:t>
           </a:r>
           <a:endParaRPr lang="en-US" sz="1600" b="1" cap="none" spc="0" dirty="0">
             <a:ln/>
@@ -3359,61 +3366,6 @@
       </dgm:t>
     </dgm:pt>
     <dgm:pt modelId="{86F3C531-528D-49DB-9EB7-8C6D718BDBE9}" type="sibTrans" cxnId="{04B3E604-C413-457E-B68C-5144C6DC9915}">
-      <dgm:prSet/>
-      <dgm:spPr/>
-      <dgm:t>
-        <a:bodyPr/>
-        <a:lstStyle/>
-        <a:p>
-          <a:endParaRPr lang="en-US" sz="1600" b="1" cap="none" spc="0">
-            <a:ln/>
-            <a:solidFill>
-              <a:schemeClr val="accent3"/>
-            </a:solidFill>
-            <a:effectLst/>
-          </a:endParaRPr>
-        </a:p>
-      </dgm:t>
-    </dgm:pt>
-    <dgm:pt modelId="{4209E399-DA0C-42D5-962A-8276C02AA8EC}">
-      <dgm:prSet phldrT="[Text]" custT="1"/>
-      <dgm:spPr/>
-      <dgm:t>
-        <a:bodyPr/>
-        <a:lstStyle/>
-        <a:p>
-          <a:r>
-            <a:rPr lang="en-US" sz="1600" b="1" cap="none" spc="0" dirty="0" smtClean="0">
-              <a:ln/>
-              <a:effectLst/>
-            </a:rPr>
-            <a:t>Itinerary Management</a:t>
-          </a:r>
-          <a:endParaRPr lang="en-US" sz="1600" b="1" cap="none" spc="0" dirty="0">
-            <a:ln/>
-            <a:effectLst/>
-          </a:endParaRPr>
-        </a:p>
-      </dgm:t>
-    </dgm:pt>
-    <dgm:pt modelId="{7ED4465C-CF67-468F-ABD7-F54F46BB659F}" type="parTrans" cxnId="{FDB03FEE-AFCB-4EB7-9D72-88B81A1DCBC1}">
-      <dgm:prSet/>
-      <dgm:spPr/>
-      <dgm:t>
-        <a:bodyPr/>
-        <a:lstStyle/>
-        <a:p>
-          <a:endParaRPr lang="en-US" sz="1600" b="1" cap="none" spc="0">
-            <a:ln/>
-            <a:solidFill>
-              <a:schemeClr val="accent3"/>
-            </a:solidFill>
-            <a:effectLst/>
-          </a:endParaRPr>
-        </a:p>
-      </dgm:t>
-    </dgm:pt>
-    <dgm:pt modelId="{F7F538C6-58F2-4EB2-9D5A-112410F40135}" type="sibTrans" cxnId="{FDB03FEE-AFCB-4EB7-9D72-88B81A1DCBC1}">
       <dgm:prSet/>
       <dgm:spPr/>
       <dgm:t>
@@ -3514,7 +3466,7 @@
       </dgm:t>
     </dgm:pt>
     <dgm:pt modelId="{81666E97-5860-45F1-88A5-99FAA589A582}" type="pres">
-      <dgm:prSet presAssocID="{885613C5-7A76-4AA0-92F0-EEDD9B446661}" presName="parentLeftMargin" presStyleLbl="node1" presStyleIdx="0" presStyleCnt="5"/>
+      <dgm:prSet presAssocID="{885613C5-7A76-4AA0-92F0-EEDD9B446661}" presName="parentLeftMargin" presStyleLbl="node1" presStyleIdx="0" presStyleCnt="4"/>
       <dgm:spPr/>
       <dgm:t>
         <a:bodyPr/>
@@ -3525,7 +3477,7 @@
       </dgm:t>
     </dgm:pt>
     <dgm:pt modelId="{E1A9A929-FEE8-4155-9F48-FAC5EE533310}" type="pres">
-      <dgm:prSet presAssocID="{885613C5-7A76-4AA0-92F0-EEDD9B446661}" presName="parentText" presStyleLbl="node1" presStyleIdx="0" presStyleCnt="5">
+      <dgm:prSet presAssocID="{885613C5-7A76-4AA0-92F0-EEDD9B446661}" presName="parentText" presStyleLbl="node1" presStyleIdx="0" presStyleCnt="4">
         <dgm:presLayoutVars>
           <dgm:chMax val="0"/>
           <dgm:bulletEnabled val="1"/>
@@ -3552,7 +3504,7 @@
       </dgm:t>
     </dgm:pt>
     <dgm:pt modelId="{BDDB4458-80D3-44D0-B84B-56AD138986B6}" type="pres">
-      <dgm:prSet presAssocID="{885613C5-7A76-4AA0-92F0-EEDD9B446661}" presName="childText" presStyleLbl="conFgAcc1" presStyleIdx="0" presStyleCnt="5">
+      <dgm:prSet presAssocID="{885613C5-7A76-4AA0-92F0-EEDD9B446661}" presName="childText" presStyleLbl="conFgAcc1" presStyleIdx="0" presStyleCnt="4">
         <dgm:presLayoutVars>
           <dgm:bulletEnabled val="1"/>
         </dgm:presLayoutVars>
@@ -3589,7 +3541,7 @@
       </dgm:t>
     </dgm:pt>
     <dgm:pt modelId="{21C03DFF-8234-4BBD-95B9-2622D999B6CC}" type="pres">
-      <dgm:prSet presAssocID="{68CDD154-F438-49AE-AED8-77DB9EC9D634}" presName="parentLeftMargin" presStyleLbl="node1" presStyleIdx="0" presStyleCnt="5"/>
+      <dgm:prSet presAssocID="{68CDD154-F438-49AE-AED8-77DB9EC9D634}" presName="parentLeftMargin" presStyleLbl="node1" presStyleIdx="0" presStyleCnt="4"/>
       <dgm:spPr/>
       <dgm:t>
         <a:bodyPr/>
@@ -3600,7 +3552,7 @@
       </dgm:t>
     </dgm:pt>
     <dgm:pt modelId="{66C22AF7-7E37-41D2-944C-F904CFD2965B}" type="pres">
-      <dgm:prSet presAssocID="{68CDD154-F438-49AE-AED8-77DB9EC9D634}" presName="parentText" presStyleLbl="node1" presStyleIdx="1" presStyleCnt="5">
+      <dgm:prSet presAssocID="{68CDD154-F438-49AE-AED8-77DB9EC9D634}" presName="parentText" presStyleLbl="node1" presStyleIdx="1" presStyleCnt="4">
         <dgm:presLayoutVars>
           <dgm:chMax val="0"/>
           <dgm:bulletEnabled val="1"/>
@@ -3627,7 +3579,7 @@
       </dgm:t>
     </dgm:pt>
     <dgm:pt modelId="{F6B0ED51-C4BD-4727-BD27-53060818C439}" type="pres">
-      <dgm:prSet presAssocID="{68CDD154-F438-49AE-AED8-77DB9EC9D634}" presName="childText" presStyleLbl="conFgAcc1" presStyleIdx="1" presStyleCnt="5">
+      <dgm:prSet presAssocID="{68CDD154-F438-49AE-AED8-77DB9EC9D634}" presName="childText" presStyleLbl="conFgAcc1" presStyleIdx="1" presStyleCnt="4">
         <dgm:presLayoutVars>
           <dgm:bulletEnabled val="1"/>
         </dgm:presLayoutVars>
@@ -3664,7 +3616,7 @@
       </dgm:t>
     </dgm:pt>
     <dgm:pt modelId="{0BB3654B-9C6D-4A61-87CC-E802B5686BC1}" type="pres">
-      <dgm:prSet presAssocID="{89B52B6D-D82C-42B0-BE38-A3B3D68F9C27}" presName="parentLeftMargin" presStyleLbl="node1" presStyleIdx="1" presStyleCnt="5"/>
+      <dgm:prSet presAssocID="{89B52B6D-D82C-42B0-BE38-A3B3D68F9C27}" presName="parentLeftMargin" presStyleLbl="node1" presStyleIdx="1" presStyleCnt="4"/>
       <dgm:spPr/>
       <dgm:t>
         <a:bodyPr/>
@@ -3675,7 +3627,7 @@
       </dgm:t>
     </dgm:pt>
     <dgm:pt modelId="{FB899ED4-0995-40A2-A345-468203D60C81}" type="pres">
-      <dgm:prSet presAssocID="{89B52B6D-D82C-42B0-BE38-A3B3D68F9C27}" presName="parentText" presStyleLbl="node1" presStyleIdx="2" presStyleCnt="5">
+      <dgm:prSet presAssocID="{89B52B6D-D82C-42B0-BE38-A3B3D68F9C27}" presName="parentText" presStyleLbl="node1" presStyleIdx="2" presStyleCnt="4">
         <dgm:presLayoutVars>
           <dgm:chMax val="0"/>
           <dgm:bulletEnabled val="1"/>
@@ -3702,7 +3654,7 @@
       </dgm:t>
     </dgm:pt>
     <dgm:pt modelId="{6F1F44CC-2CF6-4D1F-9380-EB8B891F3B87}" type="pres">
-      <dgm:prSet presAssocID="{89B52B6D-D82C-42B0-BE38-A3B3D68F9C27}" presName="childText" presStyleLbl="conFgAcc1" presStyleIdx="2" presStyleCnt="5">
+      <dgm:prSet presAssocID="{89B52B6D-D82C-42B0-BE38-A3B3D68F9C27}" presName="childText" presStyleLbl="conFgAcc1" presStyleIdx="2" presStyleCnt="4">
         <dgm:presLayoutVars>
           <dgm:bulletEnabled val="1"/>
         </dgm:presLayoutVars>
@@ -3727,81 +3679,6 @@
         </a:p>
       </dgm:t>
     </dgm:pt>
-    <dgm:pt modelId="{D633A690-4C7E-41DE-AAB7-6D1D25518FAE}" type="pres">
-      <dgm:prSet presAssocID="{4209E399-DA0C-42D5-962A-8276C02AA8EC}" presName="parentLin" presStyleCnt="0"/>
-      <dgm:spPr/>
-      <dgm:t>
-        <a:bodyPr/>
-        <a:lstStyle/>
-        <a:p>
-          <a:endParaRPr lang="en-US"/>
-        </a:p>
-      </dgm:t>
-    </dgm:pt>
-    <dgm:pt modelId="{C6C87D8D-4034-4397-984C-9BF8EEE0A79B}" type="pres">
-      <dgm:prSet presAssocID="{4209E399-DA0C-42D5-962A-8276C02AA8EC}" presName="parentLeftMargin" presStyleLbl="node1" presStyleIdx="2" presStyleCnt="5"/>
-      <dgm:spPr/>
-      <dgm:t>
-        <a:bodyPr/>
-        <a:lstStyle/>
-        <a:p>
-          <a:endParaRPr lang="en-US"/>
-        </a:p>
-      </dgm:t>
-    </dgm:pt>
-    <dgm:pt modelId="{44B548FB-45D5-465C-AA05-763364E65BC9}" type="pres">
-      <dgm:prSet presAssocID="{4209E399-DA0C-42D5-962A-8276C02AA8EC}" presName="parentText" presStyleLbl="node1" presStyleIdx="3" presStyleCnt="5">
-        <dgm:presLayoutVars>
-          <dgm:chMax val="0"/>
-          <dgm:bulletEnabled val="1"/>
-        </dgm:presLayoutVars>
-      </dgm:prSet>
-      <dgm:spPr/>
-      <dgm:t>
-        <a:bodyPr/>
-        <a:lstStyle/>
-        <a:p>
-          <a:endParaRPr lang="en-US"/>
-        </a:p>
-      </dgm:t>
-    </dgm:pt>
-    <dgm:pt modelId="{2B688452-9676-4572-8FCC-7EBB2177883D}" type="pres">
-      <dgm:prSet presAssocID="{4209E399-DA0C-42D5-962A-8276C02AA8EC}" presName="negativeSpace" presStyleCnt="0"/>
-      <dgm:spPr/>
-      <dgm:t>
-        <a:bodyPr/>
-        <a:lstStyle/>
-        <a:p>
-          <a:endParaRPr lang="en-US"/>
-        </a:p>
-      </dgm:t>
-    </dgm:pt>
-    <dgm:pt modelId="{1B040495-5579-4301-BCA9-162DC725BE9B}" type="pres">
-      <dgm:prSet presAssocID="{4209E399-DA0C-42D5-962A-8276C02AA8EC}" presName="childText" presStyleLbl="conFgAcc1" presStyleIdx="3" presStyleCnt="5">
-        <dgm:presLayoutVars>
-          <dgm:bulletEnabled val="1"/>
-        </dgm:presLayoutVars>
-      </dgm:prSet>
-      <dgm:spPr/>
-      <dgm:t>
-        <a:bodyPr/>
-        <a:lstStyle/>
-        <a:p>
-          <a:endParaRPr lang="en-US"/>
-        </a:p>
-      </dgm:t>
-    </dgm:pt>
-    <dgm:pt modelId="{FA29502E-CFDF-46D5-838D-B163F0FB93F1}" type="pres">
-      <dgm:prSet presAssocID="{F7F538C6-58F2-4EB2-9D5A-112410F40135}" presName="spaceBetweenRectangles" presStyleCnt="0"/>
-      <dgm:spPr/>
-      <dgm:t>
-        <a:bodyPr/>
-        <a:lstStyle/>
-        <a:p>
-          <a:endParaRPr lang="en-US"/>
-        </a:p>
-      </dgm:t>
-    </dgm:pt>
     <dgm:pt modelId="{35976697-83B8-454B-ACE2-4571E527B678}" type="pres">
       <dgm:prSet presAssocID="{BF9A83B9-8111-4B78-8600-312D1688C140}" presName="parentLin" presStyleCnt="0"/>
       <dgm:spPr/>
@@ -3814,7 +3691,7 @@
       </dgm:t>
     </dgm:pt>
     <dgm:pt modelId="{8ED20E6A-F08F-4955-95AA-301A4ACB2F6E}" type="pres">
-      <dgm:prSet presAssocID="{BF9A83B9-8111-4B78-8600-312D1688C140}" presName="parentLeftMargin" presStyleLbl="node1" presStyleIdx="3" presStyleCnt="5"/>
+      <dgm:prSet presAssocID="{BF9A83B9-8111-4B78-8600-312D1688C140}" presName="parentLeftMargin" presStyleLbl="node1" presStyleIdx="2" presStyleCnt="4"/>
       <dgm:spPr/>
       <dgm:t>
         <a:bodyPr/>
@@ -3825,7 +3702,7 @@
       </dgm:t>
     </dgm:pt>
     <dgm:pt modelId="{25B48118-6B58-4064-9C50-F7B4852148FC}" type="pres">
-      <dgm:prSet presAssocID="{BF9A83B9-8111-4B78-8600-312D1688C140}" presName="parentText" presStyleLbl="node1" presStyleIdx="4" presStyleCnt="5">
+      <dgm:prSet presAssocID="{BF9A83B9-8111-4B78-8600-312D1688C140}" presName="parentText" presStyleLbl="node1" presStyleIdx="3" presStyleCnt="4">
         <dgm:presLayoutVars>
           <dgm:chMax val="0"/>
           <dgm:bulletEnabled val="1"/>
@@ -3852,7 +3729,7 @@
       </dgm:t>
     </dgm:pt>
     <dgm:pt modelId="{40AFF034-79FB-446D-A396-A1D78C5E83DA}" type="pres">
-      <dgm:prSet presAssocID="{BF9A83B9-8111-4B78-8600-312D1688C140}" presName="childText" presStyleLbl="conFgAcc1" presStyleIdx="4" presStyleCnt="5">
+      <dgm:prSet presAssocID="{BF9A83B9-8111-4B78-8600-312D1688C140}" presName="childText" presStyleLbl="conFgAcc1" presStyleIdx="3" presStyleCnt="4">
         <dgm:presLayoutVars>
           <dgm:bulletEnabled val="1"/>
         </dgm:presLayoutVars>
@@ -3868,22 +3745,19 @@
     </dgm:pt>
   </dgm:ptLst>
   <dgm:cxnLst>
+    <dgm:cxn modelId="{D6122ACD-1685-43B1-9C5B-E1326B60B129}" type="presOf" srcId="{EF1F78ED-E9D5-44E4-97D4-B3FEFD902986}" destId="{DD69F0F8-C7C4-4EF4-8C1C-51E0155113CE}" srcOrd="0" destOrd="0" presId="urn:microsoft.com/office/officeart/2005/8/layout/list1"/>
+    <dgm:cxn modelId="{FFD1B7FF-14F9-4CBB-8E58-FD9C5F7FEADE}" type="presOf" srcId="{68CDD154-F438-49AE-AED8-77DB9EC9D634}" destId="{66C22AF7-7E37-41D2-944C-F904CFD2965B}" srcOrd="1" destOrd="0" presId="urn:microsoft.com/office/officeart/2005/8/layout/list1"/>
+    <dgm:cxn modelId="{9797B96C-17EB-46FB-9167-2BD4C6C8E8B2}" type="presOf" srcId="{BF9A83B9-8111-4B78-8600-312D1688C140}" destId="{8ED20E6A-F08F-4955-95AA-301A4ACB2F6E}" srcOrd="0" destOrd="0" presId="urn:microsoft.com/office/officeart/2005/8/layout/list1"/>
     <dgm:cxn modelId="{A3C9F58B-A2EE-444B-90C0-FC02C3F66175}" type="presOf" srcId="{885613C5-7A76-4AA0-92F0-EEDD9B446661}" destId="{81666E97-5860-45F1-88A5-99FAA589A582}" srcOrd="0" destOrd="0" presId="urn:microsoft.com/office/officeart/2005/8/layout/list1"/>
-    <dgm:cxn modelId="{26E52850-E159-4B84-9BAE-D590FD1CD455}" type="presOf" srcId="{4209E399-DA0C-42D5-962A-8276C02AA8EC}" destId="{44B548FB-45D5-465C-AA05-763364E65BC9}" srcOrd="1" destOrd="0" presId="urn:microsoft.com/office/officeart/2005/8/layout/list1"/>
-    <dgm:cxn modelId="{FFD1B7FF-14F9-4CBB-8E58-FD9C5F7FEADE}" type="presOf" srcId="{68CDD154-F438-49AE-AED8-77DB9EC9D634}" destId="{66C22AF7-7E37-41D2-944C-F904CFD2965B}" srcOrd="1" destOrd="0" presId="urn:microsoft.com/office/officeart/2005/8/layout/list1"/>
-    <dgm:cxn modelId="{60E6AA33-A858-4310-A69D-E844E3184D77}" type="presOf" srcId="{4209E399-DA0C-42D5-962A-8276C02AA8EC}" destId="{C6C87D8D-4034-4397-984C-9BF8EEE0A79B}" srcOrd="0" destOrd="0" presId="urn:microsoft.com/office/officeart/2005/8/layout/list1"/>
-    <dgm:cxn modelId="{FDB03FEE-AFCB-4EB7-9D72-88B81A1DCBC1}" srcId="{EF1F78ED-E9D5-44E4-97D4-B3FEFD902986}" destId="{4209E399-DA0C-42D5-962A-8276C02AA8EC}" srcOrd="3" destOrd="0" parTransId="{7ED4465C-CF67-468F-ABD7-F54F46BB659F}" sibTransId="{F7F538C6-58F2-4EB2-9D5A-112410F40135}"/>
+    <dgm:cxn modelId="{F60FB540-C952-4949-8589-E734F5994257}" type="presOf" srcId="{89B52B6D-D82C-42B0-BE38-A3B3D68F9C27}" destId="{0BB3654B-9C6D-4A61-87CC-E802B5686BC1}" srcOrd="0" destOrd="0" presId="urn:microsoft.com/office/officeart/2005/8/layout/list1"/>
+    <dgm:cxn modelId="{CB57BA4F-ABA8-48A9-9D26-B1279D4664BC}" srcId="{EF1F78ED-E9D5-44E4-97D4-B3FEFD902986}" destId="{BF9A83B9-8111-4B78-8600-312D1688C140}" srcOrd="3" destOrd="0" parTransId="{8FA8D553-4648-4D63-9876-6E7449F8F18A}" sibTransId="{9D0571FA-F277-43A1-BCD9-ED2072122346}"/>
     <dgm:cxn modelId="{C99778AD-4EA2-413E-988E-63DB77468AE8}" srcId="{EF1F78ED-E9D5-44E4-97D4-B3FEFD902986}" destId="{68CDD154-F438-49AE-AED8-77DB9EC9D634}" srcOrd="1" destOrd="0" parTransId="{80147D89-2F73-4A3C-8D2E-F94C278F0084}" sibTransId="{8E8D4616-98CD-450E-B33D-2C9FC2B13B55}"/>
-    <dgm:cxn modelId="{F60FB540-C952-4949-8589-E734F5994257}" type="presOf" srcId="{89B52B6D-D82C-42B0-BE38-A3B3D68F9C27}" destId="{0BB3654B-9C6D-4A61-87CC-E802B5686BC1}" srcOrd="0" destOrd="0" presId="urn:microsoft.com/office/officeart/2005/8/layout/list1"/>
+    <dgm:cxn modelId="{EAD8F820-CBC1-48D7-A8A9-64A6FBEB2CD0}" type="presOf" srcId="{68CDD154-F438-49AE-AED8-77DB9EC9D634}" destId="{21C03DFF-8234-4BBD-95B9-2622D999B6CC}" srcOrd="0" destOrd="0" presId="urn:microsoft.com/office/officeart/2005/8/layout/list1"/>
     <dgm:cxn modelId="{04B3E604-C413-457E-B68C-5144C6DC9915}" srcId="{EF1F78ED-E9D5-44E4-97D4-B3FEFD902986}" destId="{89B52B6D-D82C-42B0-BE38-A3B3D68F9C27}" srcOrd="2" destOrd="0" parTransId="{A5642D67-0660-487A-A1E2-D092914AC2EB}" sibTransId="{86F3C531-528D-49DB-9EB7-8C6D718BDBE9}"/>
-    <dgm:cxn modelId="{EAD8F820-CBC1-48D7-A8A9-64A6FBEB2CD0}" type="presOf" srcId="{68CDD154-F438-49AE-AED8-77DB9EC9D634}" destId="{21C03DFF-8234-4BBD-95B9-2622D999B6CC}" srcOrd="0" destOrd="0" presId="urn:microsoft.com/office/officeart/2005/8/layout/list1"/>
+    <dgm:cxn modelId="{C9E4C59F-1A71-4E66-84D4-AE84CE96437F}" type="presOf" srcId="{885613C5-7A76-4AA0-92F0-EEDD9B446661}" destId="{E1A9A929-FEE8-4155-9F48-FAC5EE533310}" srcOrd="1" destOrd="0" presId="urn:microsoft.com/office/officeart/2005/8/layout/list1"/>
     <dgm:cxn modelId="{48EEECB1-3112-4C42-87DF-4BFE0EF38A24}" type="presOf" srcId="{BF9A83B9-8111-4B78-8600-312D1688C140}" destId="{25B48118-6B58-4064-9C50-F7B4852148FC}" srcOrd="1" destOrd="0" presId="urn:microsoft.com/office/officeart/2005/8/layout/list1"/>
-    <dgm:cxn modelId="{C9E4C59F-1A71-4E66-84D4-AE84CE96437F}" type="presOf" srcId="{885613C5-7A76-4AA0-92F0-EEDD9B446661}" destId="{E1A9A929-FEE8-4155-9F48-FAC5EE533310}" srcOrd="1" destOrd="0" presId="urn:microsoft.com/office/officeart/2005/8/layout/list1"/>
+    <dgm:cxn modelId="{41B59570-FE80-4E7F-9E79-0C4F1EE64B49}" srcId="{EF1F78ED-E9D5-44E4-97D4-B3FEFD902986}" destId="{885613C5-7A76-4AA0-92F0-EEDD9B446661}" srcOrd="0" destOrd="0" parTransId="{A964CD41-1FAB-4DC7-BFB1-8EFFD3ADEC73}" sibTransId="{6C21FB75-BC17-41CC-880D-0FB92EFFD8D8}"/>
     <dgm:cxn modelId="{8F58D411-B0D3-49B8-8DB2-4EA8C96091D5}" type="presOf" srcId="{89B52B6D-D82C-42B0-BE38-A3B3D68F9C27}" destId="{FB899ED4-0995-40A2-A345-468203D60C81}" srcOrd="1" destOrd="0" presId="urn:microsoft.com/office/officeart/2005/8/layout/list1"/>
-    <dgm:cxn modelId="{D6122ACD-1685-43B1-9C5B-E1326B60B129}" type="presOf" srcId="{EF1F78ED-E9D5-44E4-97D4-B3FEFD902986}" destId="{DD69F0F8-C7C4-4EF4-8C1C-51E0155113CE}" srcOrd="0" destOrd="0" presId="urn:microsoft.com/office/officeart/2005/8/layout/list1"/>
-    <dgm:cxn modelId="{CB57BA4F-ABA8-48A9-9D26-B1279D4664BC}" srcId="{EF1F78ED-E9D5-44E4-97D4-B3FEFD902986}" destId="{BF9A83B9-8111-4B78-8600-312D1688C140}" srcOrd="4" destOrd="0" parTransId="{8FA8D553-4648-4D63-9876-6E7449F8F18A}" sibTransId="{9D0571FA-F277-43A1-BCD9-ED2072122346}"/>
-    <dgm:cxn modelId="{41B59570-FE80-4E7F-9E79-0C4F1EE64B49}" srcId="{EF1F78ED-E9D5-44E4-97D4-B3FEFD902986}" destId="{885613C5-7A76-4AA0-92F0-EEDD9B446661}" srcOrd="0" destOrd="0" parTransId="{A964CD41-1FAB-4DC7-BFB1-8EFFD3ADEC73}" sibTransId="{6C21FB75-BC17-41CC-880D-0FB92EFFD8D8}"/>
-    <dgm:cxn modelId="{9797B96C-17EB-46FB-9167-2BD4C6C8E8B2}" type="presOf" srcId="{BF9A83B9-8111-4B78-8600-312D1688C140}" destId="{8ED20E6A-F08F-4955-95AA-301A4ACB2F6E}" srcOrd="0" destOrd="0" presId="urn:microsoft.com/office/officeart/2005/8/layout/list1"/>
     <dgm:cxn modelId="{FE8DE26B-BE19-4828-A822-C5FFD39F086C}" type="presParOf" srcId="{DD69F0F8-C7C4-4EF4-8C1C-51E0155113CE}" destId="{2AC9D863-F73C-450B-9D85-60B005DA622F}" srcOrd="0" destOrd="0" presId="urn:microsoft.com/office/officeart/2005/8/layout/list1"/>
     <dgm:cxn modelId="{D99899A1-5174-4AE1-B68C-888903C0F203}" type="presParOf" srcId="{2AC9D863-F73C-450B-9D85-60B005DA622F}" destId="{81666E97-5860-45F1-88A5-99FAA589A582}" srcOrd="0" destOrd="0" presId="urn:microsoft.com/office/officeart/2005/8/layout/list1"/>
     <dgm:cxn modelId="{8E54FAD1-7DFD-4CAB-B580-2BCDC72E2854}" type="presParOf" srcId="{2AC9D863-F73C-450B-9D85-60B005DA622F}" destId="{E1A9A929-FEE8-4155-9F48-FAC5EE533310}" srcOrd="1" destOrd="0" presId="urn:microsoft.com/office/officeart/2005/8/layout/list1"/>
@@ -3902,23 +3776,17 @@
     <dgm:cxn modelId="{CE1BFEF1-5320-473F-A412-377A99778960}" type="presParOf" srcId="{DD69F0F8-C7C4-4EF4-8C1C-51E0155113CE}" destId="{868AE5E0-B723-46BA-9B8A-7BDE27FDAC96}" srcOrd="9" destOrd="0" presId="urn:microsoft.com/office/officeart/2005/8/layout/list1"/>
     <dgm:cxn modelId="{95D26A03-5A76-4D36-8DA8-491C6DEAA077}" type="presParOf" srcId="{DD69F0F8-C7C4-4EF4-8C1C-51E0155113CE}" destId="{6F1F44CC-2CF6-4D1F-9380-EB8B891F3B87}" srcOrd="10" destOrd="0" presId="urn:microsoft.com/office/officeart/2005/8/layout/list1"/>
     <dgm:cxn modelId="{BB04518A-23A3-4323-B70E-19A204A379C5}" type="presParOf" srcId="{DD69F0F8-C7C4-4EF4-8C1C-51E0155113CE}" destId="{2830F6C9-0CD4-4CC1-B63C-B8212F78FF42}" srcOrd="11" destOrd="0" presId="urn:microsoft.com/office/officeart/2005/8/layout/list1"/>
-    <dgm:cxn modelId="{8B5A0B6E-DA0C-40C5-A13C-EFBF539D3593}" type="presParOf" srcId="{DD69F0F8-C7C4-4EF4-8C1C-51E0155113CE}" destId="{D633A690-4C7E-41DE-AAB7-6D1D25518FAE}" srcOrd="12" destOrd="0" presId="urn:microsoft.com/office/officeart/2005/8/layout/list1"/>
-    <dgm:cxn modelId="{077CC5B9-AAF8-4094-8CBC-79C6B869E65A}" type="presParOf" srcId="{D633A690-4C7E-41DE-AAB7-6D1D25518FAE}" destId="{C6C87D8D-4034-4397-984C-9BF8EEE0A79B}" srcOrd="0" destOrd="0" presId="urn:microsoft.com/office/officeart/2005/8/layout/list1"/>
-    <dgm:cxn modelId="{DD62B089-D0D7-4BA8-A45F-432E6793B209}" type="presParOf" srcId="{D633A690-4C7E-41DE-AAB7-6D1D25518FAE}" destId="{44B548FB-45D5-465C-AA05-763364E65BC9}" srcOrd="1" destOrd="0" presId="urn:microsoft.com/office/officeart/2005/8/layout/list1"/>
-    <dgm:cxn modelId="{8C584666-0C7B-4D9F-B5E4-825208D10A30}" type="presParOf" srcId="{DD69F0F8-C7C4-4EF4-8C1C-51E0155113CE}" destId="{2B688452-9676-4572-8FCC-7EBB2177883D}" srcOrd="13" destOrd="0" presId="urn:microsoft.com/office/officeart/2005/8/layout/list1"/>
-    <dgm:cxn modelId="{CF55FA1F-69C7-40B3-8018-DA90868607E4}" type="presParOf" srcId="{DD69F0F8-C7C4-4EF4-8C1C-51E0155113CE}" destId="{1B040495-5579-4301-BCA9-162DC725BE9B}" srcOrd="14" destOrd="0" presId="urn:microsoft.com/office/officeart/2005/8/layout/list1"/>
-    <dgm:cxn modelId="{ED6D56B3-BE4F-4AD0-BF3D-272980B0E964}" type="presParOf" srcId="{DD69F0F8-C7C4-4EF4-8C1C-51E0155113CE}" destId="{FA29502E-CFDF-46D5-838D-B163F0FB93F1}" srcOrd="15" destOrd="0" presId="urn:microsoft.com/office/officeart/2005/8/layout/list1"/>
-    <dgm:cxn modelId="{B1B149B0-7774-4B98-A0DD-68B8E1155146}" type="presParOf" srcId="{DD69F0F8-C7C4-4EF4-8C1C-51E0155113CE}" destId="{35976697-83B8-454B-ACE2-4571E527B678}" srcOrd="16" destOrd="0" presId="urn:microsoft.com/office/officeart/2005/8/layout/list1"/>
+    <dgm:cxn modelId="{B1B149B0-7774-4B98-A0DD-68B8E1155146}" type="presParOf" srcId="{DD69F0F8-C7C4-4EF4-8C1C-51E0155113CE}" destId="{35976697-83B8-454B-ACE2-4571E527B678}" srcOrd="12" destOrd="0" presId="urn:microsoft.com/office/officeart/2005/8/layout/list1"/>
     <dgm:cxn modelId="{171F3A33-68D9-420F-9A4E-29619858DD7F}" type="presParOf" srcId="{35976697-83B8-454B-ACE2-4571E527B678}" destId="{8ED20E6A-F08F-4955-95AA-301A4ACB2F6E}" srcOrd="0" destOrd="0" presId="urn:microsoft.com/office/officeart/2005/8/layout/list1"/>
     <dgm:cxn modelId="{F926DDEC-3E78-4C1E-9BE6-1855A314CDA3}" type="presParOf" srcId="{35976697-83B8-454B-ACE2-4571E527B678}" destId="{25B48118-6B58-4064-9C50-F7B4852148FC}" srcOrd="1" destOrd="0" presId="urn:microsoft.com/office/officeart/2005/8/layout/list1"/>
-    <dgm:cxn modelId="{F401E6A0-DA35-425F-825F-D98826F60590}" type="presParOf" srcId="{DD69F0F8-C7C4-4EF4-8C1C-51E0155113CE}" destId="{8C709240-4DF1-42AB-B93B-B126A518580F}" srcOrd="17" destOrd="0" presId="urn:microsoft.com/office/officeart/2005/8/layout/list1"/>
-    <dgm:cxn modelId="{600ACC10-E972-4FE0-AD08-7D4B1FE76A6E}" type="presParOf" srcId="{DD69F0F8-C7C4-4EF4-8C1C-51E0155113CE}" destId="{40AFF034-79FB-446D-A396-A1D78C5E83DA}" srcOrd="18" destOrd="0" presId="urn:microsoft.com/office/officeart/2005/8/layout/list1"/>
+    <dgm:cxn modelId="{F401E6A0-DA35-425F-825F-D98826F60590}" type="presParOf" srcId="{DD69F0F8-C7C4-4EF4-8C1C-51E0155113CE}" destId="{8C709240-4DF1-42AB-B93B-B126A518580F}" srcOrd="13" destOrd="0" presId="urn:microsoft.com/office/officeart/2005/8/layout/list1"/>
+    <dgm:cxn modelId="{600ACC10-E972-4FE0-AD08-7D4B1FE76A6E}" type="presParOf" srcId="{DD69F0F8-C7C4-4EF4-8C1C-51E0155113CE}" destId="{40AFF034-79FB-446D-A396-A1D78C5E83DA}" srcOrd="14" destOrd="0" presId="urn:microsoft.com/office/officeart/2005/8/layout/list1"/>
   </dgm:cxnLst>
   <dgm:bg/>
   <dgm:whole/>
   <dgm:extLst>
     <a:ext uri="http://schemas.microsoft.com/office/drawing/2008/diagram">
-      <dsp:dataModelExt xmlns:dsp="http://schemas.microsoft.com/office/drawing/2008/diagram" xmlns="" relId="rId6" minVer="http://schemas.openxmlformats.org/drawingml/2006/diagram"/>
+      <dsp:dataModelExt xmlns:dsp="http://schemas.microsoft.com/office/drawing/2008/diagram" relId="rId6" minVer="http://schemas.openxmlformats.org/drawingml/2006/diagram"/>
     </a:ext>
   </dgm:extLst>
 </dgm:dataModel>
@@ -4149,17 +4017,17 @@
     </dgm:pt>
   </dgm:ptLst>
   <dgm:cxnLst>
+    <dgm:cxn modelId="{0F92CF51-8E61-460B-8E99-6FCFD7D21AC4}" type="presOf" srcId="{3ED2506A-D607-4A12-8A50-AC72420F3F00}" destId="{715D256F-02F7-4191-B84E-3A4C6CD8FFC5}" srcOrd="0" destOrd="0" presId="urn:microsoft.com/office/officeart/2005/8/layout/process2"/>
+    <dgm:cxn modelId="{8181B420-CCBA-47B0-99DB-8B0F75FCFC67}" type="presOf" srcId="{50A8F3E4-F51A-4E67-BB1C-EFC8155DD776}" destId="{5EF98626-1B98-4F0E-B74A-248A9D343D4B}" srcOrd="1" destOrd="0" presId="urn:microsoft.com/office/officeart/2005/8/layout/process2"/>
+    <dgm:cxn modelId="{B5133DE3-4354-4D03-B7CF-D23477E96DD9}" srcId="{DC9B3652-DE2A-4335-B0FB-3045EDEEA6A8}" destId="{8CAA25DF-3B38-443D-A48F-CCAB7142450C}" srcOrd="2" destOrd="0" parTransId="{4BD1F383-75F3-4570-947F-2F89081482BF}" sibTransId="{186EB40E-0379-4173-8900-E632C05B1B0B}"/>
+    <dgm:cxn modelId="{442EB815-09F3-4564-824E-AF9A49E81176}" srcId="{DC9B3652-DE2A-4335-B0FB-3045EDEEA6A8}" destId="{0E522B13-F764-4BC6-83A0-CA4F5944C6E0}" srcOrd="1" destOrd="0" parTransId="{D0C64C9C-06C7-4696-B64E-72EB6765D37D}" sibTransId="{B7FC2DBC-2209-4B52-A6BB-A5B96B108E97}"/>
+    <dgm:cxn modelId="{E8BC3270-1B78-42AA-98F0-9309B2A170EE}" type="presOf" srcId="{8CAA25DF-3B38-443D-A48F-CCAB7142450C}" destId="{4DA5EE49-8168-4D22-9537-7BE4A3708548}" srcOrd="0" destOrd="0" presId="urn:microsoft.com/office/officeart/2005/8/layout/process2"/>
     <dgm:cxn modelId="{F18AB1FE-0025-496D-BE04-40DF17B8D59D}" type="presOf" srcId="{DC9B3652-DE2A-4335-B0FB-3045EDEEA6A8}" destId="{40A287E9-C42B-4334-9643-572CE6DD897B}" srcOrd="0" destOrd="0" presId="urn:microsoft.com/office/officeart/2005/8/layout/process2"/>
+    <dgm:cxn modelId="{801EFD6F-FC26-4BA6-AA03-29FB41AE3CC1}" type="presOf" srcId="{B7FC2DBC-2209-4B52-A6BB-A5B96B108E97}" destId="{D7B61D4E-81AD-4336-8A85-CB458552E574}" srcOrd="1" destOrd="0" presId="urn:microsoft.com/office/officeart/2005/8/layout/process2"/>
+    <dgm:cxn modelId="{1E76EC3B-6F04-4B8F-9B08-F745AF155804}" type="presOf" srcId="{B7FC2DBC-2209-4B52-A6BB-A5B96B108E97}" destId="{30F2A522-5361-42FD-BDF3-9AAF9B6E48CD}" srcOrd="0" destOrd="0" presId="urn:microsoft.com/office/officeart/2005/8/layout/process2"/>
+    <dgm:cxn modelId="{B120A2B9-9B85-406D-954D-6713BD88FF5C}" srcId="{DC9B3652-DE2A-4335-B0FB-3045EDEEA6A8}" destId="{3ED2506A-D607-4A12-8A50-AC72420F3F00}" srcOrd="0" destOrd="0" parTransId="{E8D3A7A7-32F7-4A63-91CB-C04C53F7C046}" sibTransId="{50A8F3E4-F51A-4E67-BB1C-EFC8155DD776}"/>
+    <dgm:cxn modelId="{BAA27956-6A5E-4829-BFFD-6D60B13C8EAC}" type="presOf" srcId="{0E522B13-F764-4BC6-83A0-CA4F5944C6E0}" destId="{BFBD83CE-AD3D-4B36-AFD4-F505FE96449E}" srcOrd="0" destOrd="0" presId="urn:microsoft.com/office/officeart/2005/8/layout/process2"/>
     <dgm:cxn modelId="{5BC899BC-FAF8-41E4-9EA1-66AA57398186}" type="presOf" srcId="{50A8F3E4-F51A-4E67-BB1C-EFC8155DD776}" destId="{C5BE00BD-745C-43E7-912B-9157D7920E0A}" srcOrd="0" destOrd="0" presId="urn:microsoft.com/office/officeart/2005/8/layout/process2"/>
-    <dgm:cxn modelId="{0F92CF51-8E61-460B-8E99-6FCFD7D21AC4}" type="presOf" srcId="{3ED2506A-D607-4A12-8A50-AC72420F3F00}" destId="{715D256F-02F7-4191-B84E-3A4C6CD8FFC5}" srcOrd="0" destOrd="0" presId="urn:microsoft.com/office/officeart/2005/8/layout/process2"/>
-    <dgm:cxn modelId="{BAA27956-6A5E-4829-BFFD-6D60B13C8EAC}" type="presOf" srcId="{0E522B13-F764-4BC6-83A0-CA4F5944C6E0}" destId="{BFBD83CE-AD3D-4B36-AFD4-F505FE96449E}" srcOrd="0" destOrd="0" presId="urn:microsoft.com/office/officeart/2005/8/layout/process2"/>
-    <dgm:cxn modelId="{E8BC3270-1B78-42AA-98F0-9309B2A170EE}" type="presOf" srcId="{8CAA25DF-3B38-443D-A48F-CCAB7142450C}" destId="{4DA5EE49-8168-4D22-9537-7BE4A3708548}" srcOrd="0" destOrd="0" presId="urn:microsoft.com/office/officeart/2005/8/layout/process2"/>
-    <dgm:cxn modelId="{B120A2B9-9B85-406D-954D-6713BD88FF5C}" srcId="{DC9B3652-DE2A-4335-B0FB-3045EDEEA6A8}" destId="{3ED2506A-D607-4A12-8A50-AC72420F3F00}" srcOrd="0" destOrd="0" parTransId="{E8D3A7A7-32F7-4A63-91CB-C04C53F7C046}" sibTransId="{50A8F3E4-F51A-4E67-BB1C-EFC8155DD776}"/>
-    <dgm:cxn modelId="{442EB815-09F3-4564-824E-AF9A49E81176}" srcId="{DC9B3652-DE2A-4335-B0FB-3045EDEEA6A8}" destId="{0E522B13-F764-4BC6-83A0-CA4F5944C6E0}" srcOrd="1" destOrd="0" parTransId="{D0C64C9C-06C7-4696-B64E-72EB6765D37D}" sibTransId="{B7FC2DBC-2209-4B52-A6BB-A5B96B108E97}"/>
-    <dgm:cxn modelId="{B5133DE3-4354-4D03-B7CF-D23477E96DD9}" srcId="{DC9B3652-DE2A-4335-B0FB-3045EDEEA6A8}" destId="{8CAA25DF-3B38-443D-A48F-CCAB7142450C}" srcOrd="2" destOrd="0" parTransId="{4BD1F383-75F3-4570-947F-2F89081482BF}" sibTransId="{186EB40E-0379-4173-8900-E632C05B1B0B}"/>
-    <dgm:cxn modelId="{1E76EC3B-6F04-4B8F-9B08-F745AF155804}" type="presOf" srcId="{B7FC2DBC-2209-4B52-A6BB-A5B96B108E97}" destId="{30F2A522-5361-42FD-BDF3-9AAF9B6E48CD}" srcOrd="0" destOrd="0" presId="urn:microsoft.com/office/officeart/2005/8/layout/process2"/>
-    <dgm:cxn modelId="{8181B420-CCBA-47B0-99DB-8B0F75FCFC67}" type="presOf" srcId="{50A8F3E4-F51A-4E67-BB1C-EFC8155DD776}" destId="{5EF98626-1B98-4F0E-B74A-248A9D343D4B}" srcOrd="1" destOrd="0" presId="urn:microsoft.com/office/officeart/2005/8/layout/process2"/>
-    <dgm:cxn modelId="{801EFD6F-FC26-4BA6-AA03-29FB41AE3CC1}" type="presOf" srcId="{B7FC2DBC-2209-4B52-A6BB-A5B96B108E97}" destId="{D7B61D4E-81AD-4336-8A85-CB458552E574}" srcOrd="1" destOrd="0" presId="urn:microsoft.com/office/officeart/2005/8/layout/process2"/>
     <dgm:cxn modelId="{08C7413F-9BBB-42CA-B81C-A9C03F1F5B27}" type="presParOf" srcId="{40A287E9-C42B-4334-9643-572CE6DD897B}" destId="{715D256F-02F7-4191-B84E-3A4C6CD8FFC5}" srcOrd="0" destOrd="0" presId="urn:microsoft.com/office/officeart/2005/8/layout/process2"/>
     <dgm:cxn modelId="{990F8155-4613-4776-AD5A-E5F243E154A7}" type="presParOf" srcId="{40A287E9-C42B-4334-9643-572CE6DD897B}" destId="{C5BE00BD-745C-43E7-912B-9157D7920E0A}" srcOrd="1" destOrd="0" presId="urn:microsoft.com/office/officeart/2005/8/layout/process2"/>
     <dgm:cxn modelId="{543C2B9E-731F-4B2F-B780-7C67A2CFC07B}" type="presParOf" srcId="{C5BE00BD-745C-43E7-912B-9157D7920E0A}" destId="{5EF98626-1B98-4F0E-B74A-248A9D343D4B}" srcOrd="0" destOrd="0" presId="urn:microsoft.com/office/officeart/2005/8/layout/process2"/>
@@ -4172,7 +4040,7 @@
   <dgm:whole/>
   <dgm:extLst>
     <a:ext uri="http://schemas.microsoft.com/office/drawing/2008/diagram">
-      <dsp:dataModelExt xmlns:dsp="http://schemas.microsoft.com/office/drawing/2008/diagram" xmlns="" relId="rId6" minVer="http://schemas.openxmlformats.org/drawingml/2006/diagram"/>
+      <dsp:dataModelExt xmlns:dsp="http://schemas.microsoft.com/office/drawing/2008/diagram" relId="rId6" minVer="http://schemas.openxmlformats.org/drawingml/2006/diagram"/>
     </a:ext>
   </dgm:extLst>
 </dgm:dataModel>
@@ -4476,20 +4344,20 @@
   </dgm:ptLst>
   <dgm:cxnLst>
     <dgm:cxn modelId="{FCD099FA-4F06-4275-9DF4-7552D29FA9CB}" type="presOf" srcId="{3ED2506A-D607-4A12-8A50-AC72420F3F00}" destId="{715D256F-02F7-4191-B84E-3A4C6CD8FFC5}" srcOrd="0" destOrd="0" presId="urn:microsoft.com/office/officeart/2005/8/layout/process2"/>
+    <dgm:cxn modelId="{3674EAE9-5C2E-4F0D-9BE7-5234E85DC312}" type="presOf" srcId="{8CAA25DF-3B38-443D-A48F-CCAB7142450C}" destId="{4DA5EE49-8168-4D22-9537-7BE4A3708548}" srcOrd="0" destOrd="0" presId="urn:microsoft.com/office/officeart/2005/8/layout/process2"/>
     <dgm:cxn modelId="{1417121F-BF3C-49F7-91CD-28895F1A9C54}" type="presOf" srcId="{50A8F3E4-F51A-4E67-BB1C-EFC8155DD776}" destId="{5EF98626-1B98-4F0E-B74A-248A9D343D4B}" srcOrd="1" destOrd="0" presId="urn:microsoft.com/office/officeart/2005/8/layout/process2"/>
-    <dgm:cxn modelId="{FD02D3B5-4382-4110-B6E3-38F56D702F7F}" type="presOf" srcId="{186EB40E-0379-4173-8900-E632C05B1B0B}" destId="{B95826F5-EC8D-4A7F-8A27-E8AB981A9383}" srcOrd="1" destOrd="0" presId="urn:microsoft.com/office/officeart/2005/8/layout/process2"/>
-    <dgm:cxn modelId="{6811263B-3ADE-4806-BEED-B5669D3BD03F}" type="presOf" srcId="{50A8F3E4-F51A-4E67-BB1C-EFC8155DD776}" destId="{C5BE00BD-745C-43E7-912B-9157D7920E0A}" srcOrd="0" destOrd="0" presId="urn:microsoft.com/office/officeart/2005/8/layout/process2"/>
     <dgm:cxn modelId="{3A49BE87-DDE8-4117-90E1-4D1F43716916}" type="presOf" srcId="{B7FC2DBC-2209-4B52-A6BB-A5B96B108E97}" destId="{30F2A522-5361-42FD-BDF3-9AAF9B6E48CD}" srcOrd="0" destOrd="0" presId="urn:microsoft.com/office/officeart/2005/8/layout/process2"/>
     <dgm:cxn modelId="{AE85E0F8-3E84-4834-ACE2-FEF364977D56}" srcId="{DC9B3652-DE2A-4335-B0FB-3045EDEEA6A8}" destId="{F9D03C1F-FCD3-47EE-8DD0-0D1606D84F14}" srcOrd="3" destOrd="0" parTransId="{9873DB66-AF3B-4D25-B308-EBD2C0797D8B}" sibTransId="{53717F26-050D-4185-9F29-62773EF64F6B}"/>
     <dgm:cxn modelId="{57875DBF-32A5-4055-B5DD-2D37F8209E9F}" type="presOf" srcId="{F9D03C1F-FCD3-47EE-8DD0-0D1606D84F14}" destId="{AE75F7EB-863A-409D-A3CE-B00CBC7A14AA}" srcOrd="0" destOrd="0" presId="urn:microsoft.com/office/officeart/2005/8/layout/process2"/>
-    <dgm:cxn modelId="{3674EAE9-5C2E-4F0D-9BE7-5234E85DC312}" type="presOf" srcId="{8CAA25DF-3B38-443D-A48F-CCAB7142450C}" destId="{4DA5EE49-8168-4D22-9537-7BE4A3708548}" srcOrd="0" destOrd="0" presId="urn:microsoft.com/office/officeart/2005/8/layout/process2"/>
+    <dgm:cxn modelId="{FD02D3B5-4382-4110-B6E3-38F56D702F7F}" type="presOf" srcId="{186EB40E-0379-4173-8900-E632C05B1B0B}" destId="{B95826F5-EC8D-4A7F-8A27-E8AB981A9383}" srcOrd="1" destOrd="0" presId="urn:microsoft.com/office/officeart/2005/8/layout/process2"/>
+    <dgm:cxn modelId="{B5133DE3-4354-4D03-B7CF-D23477E96DD9}" srcId="{DC9B3652-DE2A-4335-B0FB-3045EDEEA6A8}" destId="{8CAA25DF-3B38-443D-A48F-CCAB7142450C}" srcOrd="2" destOrd="0" parTransId="{4BD1F383-75F3-4570-947F-2F89081482BF}" sibTransId="{186EB40E-0379-4173-8900-E632C05B1B0B}"/>
+    <dgm:cxn modelId="{1F632DDF-2108-42D1-8F30-E4933BE2547B}" type="presOf" srcId="{DC9B3652-DE2A-4335-B0FB-3045EDEEA6A8}" destId="{40A287E9-C42B-4334-9643-572CE6DD897B}" srcOrd="0" destOrd="0" presId="urn:microsoft.com/office/officeart/2005/8/layout/process2"/>
+    <dgm:cxn modelId="{442EB815-09F3-4564-824E-AF9A49E81176}" srcId="{DC9B3652-DE2A-4335-B0FB-3045EDEEA6A8}" destId="{0E522B13-F764-4BC6-83A0-CA4F5944C6E0}" srcOrd="1" destOrd="0" parTransId="{D0C64C9C-06C7-4696-B64E-72EB6765D37D}" sibTransId="{B7FC2DBC-2209-4B52-A6BB-A5B96B108E97}"/>
+    <dgm:cxn modelId="{25EFED14-9170-49F6-B528-DAADC8ECC110}" type="presOf" srcId="{186EB40E-0379-4173-8900-E632C05B1B0B}" destId="{7876155E-F8DD-4EF2-AD82-9C7F7224B37D}" srcOrd="0" destOrd="0" presId="urn:microsoft.com/office/officeart/2005/8/layout/process2"/>
     <dgm:cxn modelId="{B120A2B9-9B85-406D-954D-6713BD88FF5C}" srcId="{DC9B3652-DE2A-4335-B0FB-3045EDEEA6A8}" destId="{3ED2506A-D607-4A12-8A50-AC72420F3F00}" srcOrd="0" destOrd="0" parTransId="{E8D3A7A7-32F7-4A63-91CB-C04C53F7C046}" sibTransId="{50A8F3E4-F51A-4E67-BB1C-EFC8155DD776}"/>
-    <dgm:cxn modelId="{1F632DDF-2108-42D1-8F30-E4933BE2547B}" type="presOf" srcId="{DC9B3652-DE2A-4335-B0FB-3045EDEEA6A8}" destId="{40A287E9-C42B-4334-9643-572CE6DD897B}" srcOrd="0" destOrd="0" presId="urn:microsoft.com/office/officeart/2005/8/layout/process2"/>
-    <dgm:cxn modelId="{B5133DE3-4354-4D03-B7CF-D23477E96DD9}" srcId="{DC9B3652-DE2A-4335-B0FB-3045EDEEA6A8}" destId="{8CAA25DF-3B38-443D-A48F-CCAB7142450C}" srcOrd="2" destOrd="0" parTransId="{4BD1F383-75F3-4570-947F-2F89081482BF}" sibTransId="{186EB40E-0379-4173-8900-E632C05B1B0B}"/>
-    <dgm:cxn modelId="{25EFED14-9170-49F6-B528-DAADC8ECC110}" type="presOf" srcId="{186EB40E-0379-4173-8900-E632C05B1B0B}" destId="{7876155E-F8DD-4EF2-AD82-9C7F7224B37D}" srcOrd="0" destOrd="0" presId="urn:microsoft.com/office/officeart/2005/8/layout/process2"/>
-    <dgm:cxn modelId="{442EB815-09F3-4564-824E-AF9A49E81176}" srcId="{DC9B3652-DE2A-4335-B0FB-3045EDEEA6A8}" destId="{0E522B13-F764-4BC6-83A0-CA4F5944C6E0}" srcOrd="1" destOrd="0" parTransId="{D0C64C9C-06C7-4696-B64E-72EB6765D37D}" sibTransId="{B7FC2DBC-2209-4B52-A6BB-A5B96B108E97}"/>
+    <dgm:cxn modelId="{C028BE47-A9CE-4C17-A602-3B095B3FB67D}" type="presOf" srcId="{0E522B13-F764-4BC6-83A0-CA4F5944C6E0}" destId="{BFBD83CE-AD3D-4B36-AFD4-F505FE96449E}" srcOrd="0" destOrd="0" presId="urn:microsoft.com/office/officeart/2005/8/layout/process2"/>
+    <dgm:cxn modelId="{6811263B-3ADE-4806-BEED-B5669D3BD03F}" type="presOf" srcId="{50A8F3E4-F51A-4E67-BB1C-EFC8155DD776}" destId="{C5BE00BD-745C-43E7-912B-9157D7920E0A}" srcOrd="0" destOrd="0" presId="urn:microsoft.com/office/officeart/2005/8/layout/process2"/>
     <dgm:cxn modelId="{AEECC6F0-8467-4F89-8B15-DD935CF58F61}" type="presOf" srcId="{B7FC2DBC-2209-4B52-A6BB-A5B96B108E97}" destId="{D7B61D4E-81AD-4336-8A85-CB458552E574}" srcOrd="1" destOrd="0" presId="urn:microsoft.com/office/officeart/2005/8/layout/process2"/>
-    <dgm:cxn modelId="{C028BE47-A9CE-4C17-A602-3B095B3FB67D}" type="presOf" srcId="{0E522B13-F764-4BC6-83A0-CA4F5944C6E0}" destId="{BFBD83CE-AD3D-4B36-AFD4-F505FE96449E}" srcOrd="0" destOrd="0" presId="urn:microsoft.com/office/officeart/2005/8/layout/process2"/>
     <dgm:cxn modelId="{122CEEBD-C34A-4231-B9CB-A3E1F536048E}" type="presParOf" srcId="{40A287E9-C42B-4334-9643-572CE6DD897B}" destId="{715D256F-02F7-4191-B84E-3A4C6CD8FFC5}" srcOrd="0" destOrd="0" presId="urn:microsoft.com/office/officeart/2005/8/layout/process2"/>
     <dgm:cxn modelId="{F5362749-61C6-45FF-A9EB-47247277E8DC}" type="presParOf" srcId="{40A287E9-C42B-4334-9643-572CE6DD897B}" destId="{C5BE00BD-745C-43E7-912B-9157D7920E0A}" srcOrd="1" destOrd="0" presId="urn:microsoft.com/office/officeart/2005/8/layout/process2"/>
     <dgm:cxn modelId="{3890D6AB-0335-43DB-970C-C41282978FDA}" type="presParOf" srcId="{C5BE00BD-745C-43E7-912B-9157D7920E0A}" destId="{5EF98626-1B98-4F0E-B74A-248A9D343D4B}" srcOrd="0" destOrd="0" presId="urn:microsoft.com/office/officeart/2005/8/layout/process2"/>
@@ -4505,7 +4373,7 @@
   <dgm:whole/>
   <dgm:extLst>
     <a:ext uri="http://schemas.microsoft.com/office/drawing/2008/diagram">
-      <dsp:dataModelExt xmlns:dsp="http://schemas.microsoft.com/office/drawing/2008/diagram" xmlns="" relId="rId11" minVer="http://schemas.openxmlformats.org/drawingml/2006/diagram"/>
+      <dsp:dataModelExt xmlns:dsp="http://schemas.microsoft.com/office/drawing/2008/diagram" relId="rId11" minVer="http://schemas.openxmlformats.org/drawingml/2006/diagram"/>
     </a:ext>
   </dgm:extLst>
 </dgm:dataModel>
@@ -4591,14 +4459,14 @@
   <dgm:whole/>
   <dgm:extLst>
     <a:ext uri="http://schemas.microsoft.com/office/drawing/2008/diagram">
-      <dsp:dataModelExt xmlns:dsp="http://schemas.microsoft.com/office/drawing/2008/diagram" xmlns="" relId="rId16" minVer="http://schemas.openxmlformats.org/drawingml/2006/diagram"/>
+      <dsp:dataModelExt xmlns:dsp="http://schemas.microsoft.com/office/drawing/2008/diagram" relId="rId16" minVer="http://schemas.openxmlformats.org/drawingml/2006/diagram"/>
     </a:ext>
   </dgm:extLst>
 </dgm:dataModel>
 </file>
 
 <file path=ppt/diagrams/drawing1.xml><?xml version="1.0" encoding="utf-8"?>
-<dsp:drawing xmlns:dgm="http://schemas.openxmlformats.org/drawingml/2006/diagram" xmlns:a="http://schemas.openxmlformats.org/drawingml/2006/main" xmlns:dsp="http://schemas.microsoft.com/office/drawing/2008/diagram">
+<dsp:drawing xmlns:dgm="http://schemas.openxmlformats.org/drawingml/2006/diagram" xmlns:dsp="http://schemas.microsoft.com/office/drawing/2008/diagram" xmlns:a="http://schemas.openxmlformats.org/drawingml/2006/main">
   <dsp:spTree>
     <dsp:nvGrpSpPr>
       <dsp:cNvPr id="0" name=""/>
@@ -4612,8 +4480,8 @@
       </dsp:nvSpPr>
       <dsp:spPr>
         <a:xfrm>
-          <a:off x="0" y="254451"/>
-          <a:ext cx="7467600" cy="302400"/>
+          <a:off x="0" y="306831"/>
+          <a:ext cx="7467600" cy="378000"/>
         </a:xfrm>
         <a:prstGeom prst="rect">
           <a:avLst/>
@@ -4660,8 +4528,8 @@
       </dsp:nvSpPr>
       <dsp:spPr>
         <a:xfrm>
-          <a:off x="373380" y="77331"/>
-          <a:ext cx="5227320" cy="354240"/>
+          <a:off x="373380" y="85431"/>
+          <a:ext cx="5227320" cy="442800"/>
         </a:xfrm>
         <a:prstGeom prst="roundRect">
           <a:avLst/>
@@ -4764,8 +4632,8 @@
         </a:p>
       </dsp:txBody>
       <dsp:txXfrm>
-        <a:off x="373380" y="77331"/>
-        <a:ext cx="5227320" cy="354240"/>
+        <a:off x="394996" y="107047"/>
+        <a:ext cx="5184088" cy="399568"/>
       </dsp:txXfrm>
     </dsp:sp>
     <dsp:sp modelId="{F6B0ED51-C4BD-4727-BD27-53060818C439}">
@@ -4775,8 +4643,8 @@
       </dsp:nvSpPr>
       <dsp:spPr>
         <a:xfrm>
-          <a:off x="0" y="798771"/>
-          <a:ext cx="7467600" cy="302400"/>
+          <a:off x="0" y="987231"/>
+          <a:ext cx="7467600" cy="378000"/>
         </a:xfrm>
         <a:prstGeom prst="rect">
           <a:avLst/>
@@ -4823,8 +4691,8 @@
       </dsp:nvSpPr>
       <dsp:spPr>
         <a:xfrm>
-          <a:off x="373380" y="621651"/>
-          <a:ext cx="5227320" cy="354240"/>
+          <a:off x="373380" y="765831"/>
+          <a:ext cx="5227320" cy="442800"/>
         </a:xfrm>
         <a:prstGeom prst="roundRect">
           <a:avLst/>
@@ -4918,7 +4786,14 @@
               <a:ln/>
               <a:effectLst/>
             </a:rPr>
-            <a:t>Staff Management</a:t>
+            <a:t>Certificate </a:t>
+          </a:r>
+          <a:r>
+            <a:rPr lang="en-US" sz="1600" b="1" kern="1200" cap="none" spc="0" dirty="0" smtClean="0">
+              <a:ln/>
+              <a:effectLst/>
+            </a:rPr>
+            <a:t>Management</a:t>
           </a:r>
           <a:endParaRPr lang="en-US" sz="1600" b="1" kern="1200" cap="none" spc="0" dirty="0">
             <a:ln/>
@@ -4927,8 +4802,8 @@
         </a:p>
       </dsp:txBody>
       <dsp:txXfrm>
-        <a:off x="373380" y="621651"/>
-        <a:ext cx="5227320" cy="354240"/>
+        <a:off x="394996" y="787447"/>
+        <a:ext cx="5184088" cy="399568"/>
       </dsp:txXfrm>
     </dsp:sp>
     <dsp:sp modelId="{6F1F44CC-2CF6-4D1F-9380-EB8B891F3B87}">
@@ -4938,8 +4813,8 @@
       </dsp:nvSpPr>
       <dsp:spPr>
         <a:xfrm>
-          <a:off x="0" y="1343091"/>
-          <a:ext cx="7467600" cy="302400"/>
+          <a:off x="0" y="1667631"/>
+          <a:ext cx="7467600" cy="378000"/>
         </a:xfrm>
         <a:prstGeom prst="rect">
           <a:avLst/>
@@ -4986,8 +4861,8 @@
       </dsp:nvSpPr>
       <dsp:spPr>
         <a:xfrm>
-          <a:off x="373380" y="1165971"/>
-          <a:ext cx="5227320" cy="354240"/>
+          <a:off x="373380" y="1446231"/>
+          <a:ext cx="5227320" cy="442800"/>
         </a:xfrm>
         <a:prstGeom prst="roundRect">
           <a:avLst/>
@@ -5090,171 +4965,8 @@
         </a:p>
       </dsp:txBody>
       <dsp:txXfrm>
-        <a:off x="373380" y="1165971"/>
-        <a:ext cx="5227320" cy="354240"/>
-      </dsp:txXfrm>
-    </dsp:sp>
-    <dsp:sp modelId="{1B040495-5579-4301-BCA9-162DC725BE9B}">
-      <dsp:nvSpPr>
-        <dsp:cNvPr id="0" name=""/>
-        <dsp:cNvSpPr/>
-      </dsp:nvSpPr>
-      <dsp:spPr>
-        <a:xfrm>
-          <a:off x="0" y="1887411"/>
-          <a:ext cx="7467600" cy="302400"/>
-        </a:xfrm>
-        <a:prstGeom prst="rect">
-          <a:avLst/>
-        </a:prstGeom>
-        <a:solidFill>
-          <a:schemeClr val="lt1">
-            <a:alpha val="90000"/>
-            <a:hueOff val="0"/>
-            <a:satOff val="0"/>
-            <a:lumOff val="0"/>
-            <a:alphaOff val="0"/>
-          </a:schemeClr>
-        </a:solidFill>
-        <a:ln w="9525" cap="flat" cmpd="sng" algn="ctr">
-          <a:solidFill>
-            <a:schemeClr val="accent1">
-              <a:hueOff val="0"/>
-              <a:satOff val="0"/>
-              <a:lumOff val="0"/>
-              <a:alphaOff val="0"/>
-            </a:schemeClr>
-          </a:solidFill>
-          <a:prstDash val="solid"/>
-        </a:ln>
-        <a:effectLst/>
-      </dsp:spPr>
-      <dsp:style>
-        <a:lnRef idx="1">
-          <a:scrgbClr r="0" g="0" b="0"/>
-        </a:lnRef>
-        <a:fillRef idx="1">
-          <a:scrgbClr r="0" g="0" b="0"/>
-        </a:fillRef>
-        <a:effectRef idx="0">
-          <a:scrgbClr r="0" g="0" b="0"/>
-        </a:effectRef>
-        <a:fontRef idx="minor"/>
-      </dsp:style>
-    </dsp:sp>
-    <dsp:sp modelId="{44B548FB-45D5-465C-AA05-763364E65BC9}">
-      <dsp:nvSpPr>
-        <dsp:cNvPr id="0" name=""/>
-        <dsp:cNvSpPr/>
-      </dsp:nvSpPr>
-      <dsp:spPr>
-        <a:xfrm>
-          <a:off x="373380" y="1710291"/>
-          <a:ext cx="5227320" cy="354240"/>
-        </a:xfrm>
-        <a:prstGeom prst="roundRect">
-          <a:avLst/>
-        </a:prstGeom>
-        <a:gradFill rotWithShape="0">
-          <a:gsLst>
-            <a:gs pos="0">
-              <a:schemeClr val="accent1">
-                <a:hueOff val="0"/>
-                <a:satOff val="0"/>
-                <a:lumOff val="0"/>
-                <a:alphaOff val="0"/>
-                <a:tint val="50000"/>
-                <a:satMod val="300000"/>
-              </a:schemeClr>
-            </a:gs>
-            <a:gs pos="35000">
-              <a:schemeClr val="accent1">
-                <a:hueOff val="0"/>
-                <a:satOff val="0"/>
-                <a:lumOff val="0"/>
-                <a:alphaOff val="0"/>
-                <a:tint val="37000"/>
-                <a:satMod val="300000"/>
-              </a:schemeClr>
-            </a:gs>
-            <a:gs pos="100000">
-              <a:schemeClr val="accent1">
-                <a:hueOff val="0"/>
-                <a:satOff val="0"/>
-                <a:lumOff val="0"/>
-                <a:alphaOff val="0"/>
-                <a:tint val="15000"/>
-                <a:satMod val="350000"/>
-              </a:schemeClr>
-            </a:gs>
-          </a:gsLst>
-          <a:lin ang="16200000" scaled="1"/>
-        </a:gradFill>
-        <a:ln>
-          <a:noFill/>
-        </a:ln>
-        <a:effectLst>
-          <a:outerShdw blurRad="40000" dist="20000" dir="5400000" rotWithShape="0">
-            <a:srgbClr val="000000">
-              <a:alpha val="38000"/>
-            </a:srgbClr>
-          </a:outerShdw>
-        </a:effectLst>
-        <a:scene3d>
-          <a:camera prst="orthographicFront"/>
-          <a:lightRig rig="flat" dir="t"/>
-        </a:scene3d>
-        <a:sp3d prstMaterial="dkEdge">
-          <a:bevelT w="8200" h="38100"/>
-        </a:sp3d>
-      </dsp:spPr>
-      <dsp:style>
-        <a:lnRef idx="0">
-          <a:scrgbClr r="0" g="0" b="0"/>
-        </a:lnRef>
-        <a:fillRef idx="2">
-          <a:scrgbClr r="0" g="0" b="0"/>
-        </a:fillRef>
-        <a:effectRef idx="1">
-          <a:scrgbClr r="0" g="0" b="0"/>
-        </a:effectRef>
-        <a:fontRef idx="minor">
-          <a:schemeClr val="dk1"/>
-        </a:fontRef>
-      </dsp:style>
-      <dsp:txBody>
-        <a:bodyPr spcFirstLastPara="0" vert="horz" wrap="square" lIns="197580" tIns="0" rIns="197580" bIns="0" numCol="1" spcCol="1270" anchor="ctr" anchorCtr="0">
-          <a:noAutofit/>
-        </a:bodyPr>
-        <a:lstStyle/>
-        <a:p>
-          <a:pPr lvl="0" algn="l" defTabSz="711200">
-            <a:lnSpc>
-              <a:spcPct val="90000"/>
-            </a:lnSpc>
-            <a:spcBef>
-              <a:spcPct val="0"/>
-            </a:spcBef>
-            <a:spcAft>
-              <a:spcPct val="35000"/>
-            </a:spcAft>
-          </a:pPr>
-          <a:r>
-            <a:rPr lang="en-US" sz="1600" b="1" kern="1200" cap="none" spc="0" dirty="0" smtClean="0">
-              <a:ln/>
-              <a:effectLst/>
-            </a:rPr>
-            <a:t>Itinerary Management</a:t>
-          </a:r>
-          <a:endParaRPr lang="en-US" sz="1600" b="1" kern="1200" cap="none" spc="0" dirty="0">
-            <a:ln/>
-            <a:effectLst/>
-          </a:endParaRPr>
-        </a:p>
-      </dsp:txBody>
-      <dsp:txXfrm>
-        <a:off x="373380" y="1710291"/>
-        <a:ext cx="5227320" cy="354240"/>
+        <a:off x="394996" y="1467847"/>
+        <a:ext cx="5184088" cy="399568"/>
       </dsp:txXfrm>
     </dsp:sp>
     <dsp:sp modelId="{40AFF034-79FB-446D-A396-A1D78C5E83DA}">
@@ -5264,8 +4976,8 @@
       </dsp:nvSpPr>
       <dsp:spPr>
         <a:xfrm>
-          <a:off x="0" y="2431731"/>
-          <a:ext cx="7467600" cy="302400"/>
+          <a:off x="0" y="2348031"/>
+          <a:ext cx="7467600" cy="378000"/>
         </a:xfrm>
         <a:prstGeom prst="rect">
           <a:avLst/>
@@ -5312,8 +5024,8 @@
       </dsp:nvSpPr>
       <dsp:spPr>
         <a:xfrm>
-          <a:off x="373380" y="2254611"/>
-          <a:ext cx="5227320" cy="354240"/>
+          <a:off x="373380" y="2126631"/>
+          <a:ext cx="5227320" cy="442800"/>
         </a:xfrm>
         <a:prstGeom prst="roundRect">
           <a:avLst/>
@@ -5416,8 +5128,8 @@
         </a:p>
       </dsp:txBody>
       <dsp:txXfrm>
-        <a:off x="373380" y="2254611"/>
-        <a:ext cx="5227320" cy="354240"/>
+        <a:off x="394996" y="2148247"/>
+        <a:ext cx="5184088" cy="399568"/>
       </dsp:txXfrm>
     </dsp:sp>
   </dsp:spTree>
@@ -5425,37 +5137,1030 @@
 </file>
 
 <file path=ppt/diagrams/drawing2.xml><?xml version="1.0" encoding="utf-8"?>
-<dsp:drawing xmlns:dgm="http://schemas.openxmlformats.org/drawingml/2006/diagram" xmlns:a="http://schemas.openxmlformats.org/drawingml/2006/main" xmlns:dsp="http://schemas.microsoft.com/office/drawing/2008/diagram">
+<dsp:drawing xmlns:dgm="http://schemas.openxmlformats.org/drawingml/2006/diagram" xmlns:dsp="http://schemas.microsoft.com/office/drawing/2008/diagram" xmlns:a="http://schemas.openxmlformats.org/drawingml/2006/main">
   <dsp:spTree>
     <dsp:nvGrpSpPr>
       <dsp:cNvPr id="0" name=""/>
       <dsp:cNvGrpSpPr/>
     </dsp:nvGrpSpPr>
     <dsp:grpSpPr/>
+    <dsp:sp modelId="{715D256F-02F7-4191-B84E-3A4C6CD8FFC5}">
+      <dsp:nvSpPr>
+        <dsp:cNvPr id="0" name=""/>
+        <dsp:cNvSpPr/>
+      </dsp:nvSpPr>
+      <dsp:spPr>
+        <a:xfrm>
+          <a:off x="228600" y="0"/>
+          <a:ext cx="1828800" cy="1016000"/>
+        </a:xfrm>
+        <a:prstGeom prst="roundRect">
+          <a:avLst>
+            <a:gd name="adj" fmla="val 10000"/>
+          </a:avLst>
+        </a:prstGeom>
+        <a:solidFill>
+          <a:schemeClr val="accent1">
+            <a:hueOff val="0"/>
+            <a:satOff val="0"/>
+            <a:lumOff val="0"/>
+            <a:alphaOff val="0"/>
+          </a:schemeClr>
+        </a:solidFill>
+        <a:ln w="25400" cap="flat" cmpd="sng" algn="ctr">
+          <a:solidFill>
+            <a:schemeClr val="lt1">
+              <a:hueOff val="0"/>
+              <a:satOff val="0"/>
+              <a:lumOff val="0"/>
+              <a:alphaOff val="0"/>
+            </a:schemeClr>
+          </a:solidFill>
+          <a:prstDash val="solid"/>
+        </a:ln>
+        <a:effectLst/>
+      </dsp:spPr>
+      <dsp:style>
+        <a:lnRef idx="2">
+          <a:scrgbClr r="0" g="0" b="0"/>
+        </a:lnRef>
+        <a:fillRef idx="1">
+          <a:scrgbClr r="0" g="0" b="0"/>
+        </a:fillRef>
+        <a:effectRef idx="0">
+          <a:scrgbClr r="0" g="0" b="0"/>
+        </a:effectRef>
+        <a:fontRef idx="minor">
+          <a:schemeClr val="lt1"/>
+        </a:fontRef>
+      </dsp:style>
+      <dsp:txBody>
+        <a:bodyPr spcFirstLastPara="0" vert="horz" wrap="square" lIns="76200" tIns="76200" rIns="76200" bIns="76200" numCol="1" spcCol="1270" anchor="ctr" anchorCtr="0">
+          <a:noAutofit/>
+        </a:bodyPr>
+        <a:lstStyle/>
+        <a:p>
+          <a:pPr lvl="0" algn="ctr" defTabSz="889000">
+            <a:lnSpc>
+              <a:spcPct val="90000"/>
+            </a:lnSpc>
+            <a:spcBef>
+              <a:spcPct val="0"/>
+            </a:spcBef>
+            <a:spcAft>
+              <a:spcPct val="35000"/>
+            </a:spcAft>
+          </a:pPr>
+          <a:r>
+            <a:rPr lang="en-US" sz="2000" kern="1200" dirty="0" smtClean="0"/>
+            <a:t>Prototyping</a:t>
+          </a:r>
+          <a:endParaRPr lang="en-US" sz="2000" kern="1200" dirty="0"/>
+        </a:p>
+      </dsp:txBody>
+      <dsp:txXfrm>
+        <a:off x="258358" y="29758"/>
+        <a:ext cx="1769284" cy="956484"/>
+      </dsp:txXfrm>
+    </dsp:sp>
+    <dsp:sp modelId="{C5BE00BD-745C-43E7-912B-9157D7920E0A}">
+      <dsp:nvSpPr>
+        <dsp:cNvPr id="0" name=""/>
+        <dsp:cNvSpPr/>
+      </dsp:nvSpPr>
+      <dsp:spPr>
+        <a:xfrm rot="5400000">
+          <a:off x="952500" y="1041399"/>
+          <a:ext cx="380999" cy="457200"/>
+        </a:xfrm>
+        <a:prstGeom prst="rightArrow">
+          <a:avLst>
+            <a:gd name="adj1" fmla="val 60000"/>
+            <a:gd name="adj2" fmla="val 50000"/>
+          </a:avLst>
+        </a:prstGeom>
+        <a:solidFill>
+          <a:schemeClr val="accent1">
+            <a:tint val="60000"/>
+            <a:hueOff val="0"/>
+            <a:satOff val="0"/>
+            <a:lumOff val="0"/>
+            <a:alphaOff val="0"/>
+          </a:schemeClr>
+        </a:solidFill>
+        <a:ln>
+          <a:noFill/>
+        </a:ln>
+        <a:effectLst/>
+      </dsp:spPr>
+      <dsp:style>
+        <a:lnRef idx="0">
+          <a:scrgbClr r="0" g="0" b="0"/>
+        </a:lnRef>
+        <a:fillRef idx="1">
+          <a:scrgbClr r="0" g="0" b="0"/>
+        </a:fillRef>
+        <a:effectRef idx="0">
+          <a:scrgbClr r="0" g="0" b="0"/>
+        </a:effectRef>
+        <a:fontRef idx="minor">
+          <a:schemeClr val="lt1"/>
+        </a:fontRef>
+      </dsp:style>
+      <dsp:txBody>
+        <a:bodyPr spcFirstLastPara="0" vert="horz" wrap="square" lIns="0" tIns="0" rIns="0" bIns="0" numCol="1" spcCol="1270" anchor="ctr" anchorCtr="0">
+          <a:noAutofit/>
+        </a:bodyPr>
+        <a:lstStyle/>
+        <a:p>
+          <a:pPr lvl="0" algn="ctr" defTabSz="711200">
+            <a:lnSpc>
+              <a:spcPct val="90000"/>
+            </a:lnSpc>
+            <a:spcBef>
+              <a:spcPct val="0"/>
+            </a:spcBef>
+            <a:spcAft>
+              <a:spcPct val="35000"/>
+            </a:spcAft>
+          </a:pPr>
+          <a:endParaRPr lang="en-US" sz="1600" kern="1200"/>
+        </a:p>
+      </dsp:txBody>
+      <dsp:txXfrm rot="-5400000">
+        <a:off x="1005840" y="1079499"/>
+        <a:ext cx="274320" cy="266699"/>
+      </dsp:txXfrm>
+    </dsp:sp>
+    <dsp:sp modelId="{BFBD83CE-AD3D-4B36-AFD4-F505FE96449E}">
+      <dsp:nvSpPr>
+        <dsp:cNvPr id="0" name=""/>
+        <dsp:cNvSpPr/>
+      </dsp:nvSpPr>
+      <dsp:spPr>
+        <a:xfrm>
+          <a:off x="228600" y="1523999"/>
+          <a:ext cx="1828800" cy="1016000"/>
+        </a:xfrm>
+        <a:prstGeom prst="roundRect">
+          <a:avLst>
+            <a:gd name="adj" fmla="val 10000"/>
+          </a:avLst>
+        </a:prstGeom>
+        <a:solidFill>
+          <a:schemeClr val="accent1">
+            <a:hueOff val="0"/>
+            <a:satOff val="0"/>
+            <a:lumOff val="0"/>
+            <a:alphaOff val="0"/>
+          </a:schemeClr>
+        </a:solidFill>
+        <a:ln w="25400" cap="flat" cmpd="sng" algn="ctr">
+          <a:solidFill>
+            <a:schemeClr val="lt1">
+              <a:hueOff val="0"/>
+              <a:satOff val="0"/>
+              <a:lumOff val="0"/>
+              <a:alphaOff val="0"/>
+            </a:schemeClr>
+          </a:solidFill>
+          <a:prstDash val="solid"/>
+        </a:ln>
+        <a:effectLst/>
+      </dsp:spPr>
+      <dsp:style>
+        <a:lnRef idx="2">
+          <a:scrgbClr r="0" g="0" b="0"/>
+        </a:lnRef>
+        <a:fillRef idx="1">
+          <a:scrgbClr r="0" g="0" b="0"/>
+        </a:fillRef>
+        <a:effectRef idx="0">
+          <a:scrgbClr r="0" g="0" b="0"/>
+        </a:effectRef>
+        <a:fontRef idx="minor">
+          <a:schemeClr val="lt1"/>
+        </a:fontRef>
+      </dsp:style>
+      <dsp:txBody>
+        <a:bodyPr spcFirstLastPara="0" vert="horz" wrap="square" lIns="76200" tIns="76200" rIns="76200" bIns="76200" numCol="1" spcCol="1270" anchor="ctr" anchorCtr="0">
+          <a:noAutofit/>
+        </a:bodyPr>
+        <a:lstStyle/>
+        <a:p>
+          <a:pPr lvl="0" algn="ctr" defTabSz="889000">
+            <a:lnSpc>
+              <a:spcPct val="90000"/>
+            </a:lnSpc>
+            <a:spcBef>
+              <a:spcPct val="0"/>
+            </a:spcBef>
+            <a:spcAft>
+              <a:spcPct val="35000"/>
+            </a:spcAft>
+          </a:pPr>
+          <a:r>
+            <a:rPr lang="en-US" sz="2000" kern="1200" dirty="0" smtClean="0"/>
+            <a:t>Use Case Modeling</a:t>
+          </a:r>
+          <a:endParaRPr lang="en-US" sz="2000" kern="1200" dirty="0"/>
+        </a:p>
+      </dsp:txBody>
+      <dsp:txXfrm>
+        <a:off x="258358" y="1553757"/>
+        <a:ext cx="1769284" cy="956484"/>
+      </dsp:txXfrm>
+    </dsp:sp>
+    <dsp:sp modelId="{30F2A522-5361-42FD-BDF3-9AAF9B6E48CD}">
+      <dsp:nvSpPr>
+        <dsp:cNvPr id="0" name=""/>
+        <dsp:cNvSpPr/>
+      </dsp:nvSpPr>
+      <dsp:spPr>
+        <a:xfrm rot="5400000">
+          <a:off x="952500" y="2565399"/>
+          <a:ext cx="381000" cy="457200"/>
+        </a:xfrm>
+        <a:prstGeom prst="rightArrow">
+          <a:avLst>
+            <a:gd name="adj1" fmla="val 60000"/>
+            <a:gd name="adj2" fmla="val 50000"/>
+          </a:avLst>
+        </a:prstGeom>
+        <a:solidFill>
+          <a:schemeClr val="accent1">
+            <a:tint val="60000"/>
+            <a:hueOff val="0"/>
+            <a:satOff val="0"/>
+            <a:lumOff val="0"/>
+            <a:alphaOff val="0"/>
+          </a:schemeClr>
+        </a:solidFill>
+        <a:ln>
+          <a:noFill/>
+        </a:ln>
+        <a:effectLst/>
+      </dsp:spPr>
+      <dsp:style>
+        <a:lnRef idx="0">
+          <a:scrgbClr r="0" g="0" b="0"/>
+        </a:lnRef>
+        <a:fillRef idx="1">
+          <a:scrgbClr r="0" g="0" b="0"/>
+        </a:fillRef>
+        <a:effectRef idx="0">
+          <a:scrgbClr r="0" g="0" b="0"/>
+        </a:effectRef>
+        <a:fontRef idx="minor">
+          <a:schemeClr val="lt1"/>
+        </a:fontRef>
+      </dsp:style>
+      <dsp:txBody>
+        <a:bodyPr spcFirstLastPara="0" vert="horz" wrap="square" lIns="0" tIns="0" rIns="0" bIns="0" numCol="1" spcCol="1270" anchor="ctr" anchorCtr="0">
+          <a:noAutofit/>
+        </a:bodyPr>
+        <a:lstStyle/>
+        <a:p>
+          <a:pPr lvl="0" algn="ctr" defTabSz="711200">
+            <a:lnSpc>
+              <a:spcPct val="90000"/>
+            </a:lnSpc>
+            <a:spcBef>
+              <a:spcPct val="0"/>
+            </a:spcBef>
+            <a:spcAft>
+              <a:spcPct val="35000"/>
+            </a:spcAft>
+          </a:pPr>
+          <a:endParaRPr lang="en-US" sz="1600" kern="1200"/>
+        </a:p>
+      </dsp:txBody>
+      <dsp:txXfrm rot="-5400000">
+        <a:off x="1005840" y="2603499"/>
+        <a:ext cx="274320" cy="266700"/>
+      </dsp:txXfrm>
+    </dsp:sp>
+    <dsp:sp modelId="{4DA5EE49-8168-4D22-9537-7BE4A3708548}">
+      <dsp:nvSpPr>
+        <dsp:cNvPr id="0" name=""/>
+        <dsp:cNvSpPr/>
+      </dsp:nvSpPr>
+      <dsp:spPr>
+        <a:xfrm>
+          <a:off x="228600" y="3047999"/>
+          <a:ext cx="1828800" cy="1016000"/>
+        </a:xfrm>
+        <a:prstGeom prst="roundRect">
+          <a:avLst>
+            <a:gd name="adj" fmla="val 10000"/>
+          </a:avLst>
+        </a:prstGeom>
+        <a:solidFill>
+          <a:schemeClr val="accent1">
+            <a:hueOff val="0"/>
+            <a:satOff val="0"/>
+            <a:lumOff val="0"/>
+            <a:alphaOff val="0"/>
+          </a:schemeClr>
+        </a:solidFill>
+        <a:ln w="25400" cap="flat" cmpd="sng" algn="ctr">
+          <a:solidFill>
+            <a:schemeClr val="lt1">
+              <a:hueOff val="0"/>
+              <a:satOff val="0"/>
+              <a:lumOff val="0"/>
+              <a:alphaOff val="0"/>
+            </a:schemeClr>
+          </a:solidFill>
+          <a:prstDash val="solid"/>
+        </a:ln>
+        <a:effectLst/>
+      </dsp:spPr>
+      <dsp:style>
+        <a:lnRef idx="2">
+          <a:scrgbClr r="0" g="0" b="0"/>
+        </a:lnRef>
+        <a:fillRef idx="1">
+          <a:scrgbClr r="0" g="0" b="0"/>
+        </a:fillRef>
+        <a:effectRef idx="0">
+          <a:scrgbClr r="0" g="0" b="0"/>
+        </a:effectRef>
+        <a:fontRef idx="minor">
+          <a:schemeClr val="lt1"/>
+        </a:fontRef>
+      </dsp:style>
+      <dsp:txBody>
+        <a:bodyPr spcFirstLastPara="0" vert="horz" wrap="square" lIns="76200" tIns="76200" rIns="76200" bIns="76200" numCol="1" spcCol="1270" anchor="ctr" anchorCtr="0">
+          <a:noAutofit/>
+        </a:bodyPr>
+        <a:lstStyle/>
+        <a:p>
+          <a:pPr lvl="0" algn="ctr" defTabSz="889000">
+            <a:lnSpc>
+              <a:spcPct val="90000"/>
+            </a:lnSpc>
+            <a:spcBef>
+              <a:spcPct val="0"/>
+            </a:spcBef>
+            <a:spcAft>
+              <a:spcPct val="35000"/>
+            </a:spcAft>
+          </a:pPr>
+          <a:r>
+            <a:rPr lang="en-US" sz="2000" kern="1200" dirty="0" smtClean="0"/>
+            <a:t>Use Case </a:t>
+          </a:r>
+          <a:r>
+            <a:rPr lang="en-US" sz="2000" kern="1200" dirty="0" err="1" smtClean="0"/>
+            <a:t>Realisation</a:t>
+          </a:r>
+          <a:r>
+            <a:rPr lang="en-US" sz="2000" kern="1200" dirty="0" smtClean="0"/>
+            <a:t> Report</a:t>
+          </a:r>
+          <a:endParaRPr lang="en-US" sz="2000" kern="1200" dirty="0"/>
+        </a:p>
+      </dsp:txBody>
+      <dsp:txXfrm>
+        <a:off x="258358" y="3077757"/>
+        <a:ext cx="1769284" cy="956484"/>
+      </dsp:txXfrm>
+    </dsp:sp>
   </dsp:spTree>
 </dsp:drawing>
 </file>
 
 <file path=ppt/diagrams/drawing3.xml><?xml version="1.0" encoding="utf-8"?>
-<dsp:drawing xmlns:dgm="http://schemas.openxmlformats.org/drawingml/2006/diagram" xmlns:a="http://schemas.openxmlformats.org/drawingml/2006/main" xmlns:dsp="http://schemas.microsoft.com/office/drawing/2008/diagram">
+<dsp:drawing xmlns:dgm="http://schemas.openxmlformats.org/drawingml/2006/diagram" xmlns:dsp="http://schemas.microsoft.com/office/drawing/2008/diagram" xmlns:a="http://schemas.openxmlformats.org/drawingml/2006/main">
   <dsp:spTree>
     <dsp:nvGrpSpPr>
       <dsp:cNvPr id="0" name=""/>
       <dsp:cNvGrpSpPr/>
     </dsp:nvGrpSpPr>
     <dsp:grpSpPr/>
+    <dsp:sp modelId="{715D256F-02F7-4191-B84E-3A4C6CD8FFC5}">
+      <dsp:nvSpPr>
+        <dsp:cNvPr id="0" name=""/>
+        <dsp:cNvSpPr/>
+      </dsp:nvSpPr>
+      <dsp:spPr>
+        <a:xfrm>
+          <a:off x="380413" y="1984"/>
+          <a:ext cx="1753772" cy="738187"/>
+        </a:xfrm>
+        <a:prstGeom prst="roundRect">
+          <a:avLst>
+            <a:gd name="adj" fmla="val 10000"/>
+          </a:avLst>
+        </a:prstGeom>
+        <a:solidFill>
+          <a:schemeClr val="accent1">
+            <a:hueOff val="0"/>
+            <a:satOff val="0"/>
+            <a:lumOff val="0"/>
+            <a:alphaOff val="0"/>
+          </a:schemeClr>
+        </a:solidFill>
+        <a:ln w="25400" cap="flat" cmpd="sng" algn="ctr">
+          <a:solidFill>
+            <a:schemeClr val="lt1">
+              <a:hueOff val="0"/>
+              <a:satOff val="0"/>
+              <a:lumOff val="0"/>
+              <a:alphaOff val="0"/>
+            </a:schemeClr>
+          </a:solidFill>
+          <a:prstDash val="solid"/>
+        </a:ln>
+        <a:effectLst/>
+      </dsp:spPr>
+      <dsp:style>
+        <a:lnRef idx="2">
+          <a:scrgbClr r="0" g="0" b="0"/>
+        </a:lnRef>
+        <a:fillRef idx="1">
+          <a:scrgbClr r="0" g="0" b="0"/>
+        </a:fillRef>
+        <a:effectRef idx="0">
+          <a:scrgbClr r="0" g="0" b="0"/>
+        </a:effectRef>
+        <a:fontRef idx="minor">
+          <a:schemeClr val="lt1"/>
+        </a:fontRef>
+      </dsp:style>
+      <dsp:txBody>
+        <a:bodyPr spcFirstLastPara="0" vert="horz" wrap="square" lIns="68580" tIns="68580" rIns="68580" bIns="68580" numCol="1" spcCol="1270" anchor="ctr" anchorCtr="0">
+          <a:noAutofit/>
+        </a:bodyPr>
+        <a:lstStyle/>
+        <a:p>
+          <a:pPr lvl="0" algn="ctr" defTabSz="800100">
+            <a:lnSpc>
+              <a:spcPct val="90000"/>
+            </a:lnSpc>
+            <a:spcBef>
+              <a:spcPct val="0"/>
+            </a:spcBef>
+            <a:spcAft>
+              <a:spcPct val="35000"/>
+            </a:spcAft>
+          </a:pPr>
+          <a:r>
+            <a:rPr lang="en-US" sz="1800" b="1" kern="1200" dirty="0" smtClean="0">
+              <a:latin typeface="Calibri" pitchFamily="34" charset="0"/>
+            </a:rPr>
+            <a:t>High-level System Design</a:t>
+          </a:r>
+          <a:endParaRPr lang="en-US" sz="1800" b="1" kern="1200" dirty="0"/>
+        </a:p>
+      </dsp:txBody>
+      <dsp:txXfrm>
+        <a:off x="402034" y="23605"/>
+        <a:ext cx="1710530" cy="694945"/>
+      </dsp:txXfrm>
+    </dsp:sp>
+    <dsp:sp modelId="{C5BE00BD-745C-43E7-912B-9157D7920E0A}">
+      <dsp:nvSpPr>
+        <dsp:cNvPr id="0" name=""/>
+        <dsp:cNvSpPr/>
+      </dsp:nvSpPr>
+      <dsp:spPr>
+        <a:xfrm rot="5400000">
+          <a:off x="1118889" y="758626"/>
+          <a:ext cx="276820" cy="332184"/>
+        </a:xfrm>
+        <a:prstGeom prst="rightArrow">
+          <a:avLst>
+            <a:gd name="adj1" fmla="val 60000"/>
+            <a:gd name="adj2" fmla="val 50000"/>
+          </a:avLst>
+        </a:prstGeom>
+        <a:solidFill>
+          <a:schemeClr val="accent1">
+            <a:tint val="60000"/>
+            <a:hueOff val="0"/>
+            <a:satOff val="0"/>
+            <a:lumOff val="0"/>
+            <a:alphaOff val="0"/>
+          </a:schemeClr>
+        </a:solidFill>
+        <a:ln>
+          <a:noFill/>
+        </a:ln>
+        <a:effectLst/>
+      </dsp:spPr>
+      <dsp:style>
+        <a:lnRef idx="0">
+          <a:scrgbClr r="0" g="0" b="0"/>
+        </a:lnRef>
+        <a:fillRef idx="1">
+          <a:scrgbClr r="0" g="0" b="0"/>
+        </a:fillRef>
+        <a:effectRef idx="0">
+          <a:scrgbClr r="0" g="0" b="0"/>
+        </a:effectRef>
+        <a:fontRef idx="minor">
+          <a:schemeClr val="lt1"/>
+        </a:fontRef>
+      </dsp:style>
+      <dsp:txBody>
+        <a:bodyPr spcFirstLastPara="0" vert="horz" wrap="square" lIns="0" tIns="0" rIns="0" bIns="0" numCol="1" spcCol="1270" anchor="ctr" anchorCtr="0">
+          <a:noAutofit/>
+        </a:bodyPr>
+        <a:lstStyle/>
+        <a:p>
+          <a:pPr lvl="0" algn="ctr" defTabSz="622300">
+            <a:lnSpc>
+              <a:spcPct val="90000"/>
+            </a:lnSpc>
+            <a:spcBef>
+              <a:spcPct val="0"/>
+            </a:spcBef>
+            <a:spcAft>
+              <a:spcPct val="35000"/>
+            </a:spcAft>
+          </a:pPr>
+          <a:endParaRPr lang="en-US" sz="1400" kern="1200"/>
+        </a:p>
+      </dsp:txBody>
+      <dsp:txXfrm rot="-5400000">
+        <a:off x="1157644" y="786308"/>
+        <a:ext cx="199310" cy="193774"/>
+      </dsp:txXfrm>
+    </dsp:sp>
+    <dsp:sp modelId="{BFBD83CE-AD3D-4B36-AFD4-F505FE96449E}">
+      <dsp:nvSpPr>
+        <dsp:cNvPr id="0" name=""/>
+        <dsp:cNvSpPr/>
+      </dsp:nvSpPr>
+      <dsp:spPr>
+        <a:xfrm>
+          <a:off x="380413" y="1109265"/>
+          <a:ext cx="1753772" cy="738187"/>
+        </a:xfrm>
+        <a:prstGeom prst="roundRect">
+          <a:avLst>
+            <a:gd name="adj" fmla="val 10000"/>
+          </a:avLst>
+        </a:prstGeom>
+        <a:solidFill>
+          <a:schemeClr val="accent1">
+            <a:hueOff val="0"/>
+            <a:satOff val="0"/>
+            <a:lumOff val="0"/>
+            <a:alphaOff val="0"/>
+          </a:schemeClr>
+        </a:solidFill>
+        <a:ln w="25400" cap="flat" cmpd="sng" algn="ctr">
+          <a:solidFill>
+            <a:schemeClr val="lt1">
+              <a:hueOff val="0"/>
+              <a:satOff val="0"/>
+              <a:lumOff val="0"/>
+              <a:alphaOff val="0"/>
+            </a:schemeClr>
+          </a:solidFill>
+          <a:prstDash val="solid"/>
+        </a:ln>
+        <a:effectLst/>
+      </dsp:spPr>
+      <dsp:style>
+        <a:lnRef idx="2">
+          <a:scrgbClr r="0" g="0" b="0"/>
+        </a:lnRef>
+        <a:fillRef idx="1">
+          <a:scrgbClr r="0" g="0" b="0"/>
+        </a:fillRef>
+        <a:effectRef idx="0">
+          <a:scrgbClr r="0" g="0" b="0"/>
+        </a:effectRef>
+        <a:fontRef idx="minor">
+          <a:schemeClr val="lt1"/>
+        </a:fontRef>
+      </dsp:style>
+      <dsp:txBody>
+        <a:bodyPr spcFirstLastPara="0" vert="horz" wrap="square" lIns="68580" tIns="68580" rIns="68580" bIns="68580" numCol="1" spcCol="1270" anchor="ctr" anchorCtr="0">
+          <a:noAutofit/>
+        </a:bodyPr>
+        <a:lstStyle/>
+        <a:p>
+          <a:pPr lvl="0" algn="ctr" defTabSz="800100">
+            <a:lnSpc>
+              <a:spcPct val="90000"/>
+            </a:lnSpc>
+            <a:spcBef>
+              <a:spcPct val="0"/>
+            </a:spcBef>
+            <a:spcAft>
+              <a:spcPct val="35000"/>
+            </a:spcAft>
+          </a:pPr>
+          <a:r>
+            <a:rPr lang="en-US" sz="1800" b="1" kern="1200" dirty="0" smtClean="0">
+              <a:latin typeface="Calibri" pitchFamily="34" charset="0"/>
+            </a:rPr>
+            <a:t>Detailed Design</a:t>
+          </a:r>
+          <a:endParaRPr lang="en-US" sz="1800" b="1" kern="1200" dirty="0"/>
+        </a:p>
+      </dsp:txBody>
+      <dsp:txXfrm>
+        <a:off x="402034" y="1130886"/>
+        <a:ext cx="1710530" cy="694945"/>
+      </dsp:txXfrm>
+    </dsp:sp>
+    <dsp:sp modelId="{30F2A522-5361-42FD-BDF3-9AAF9B6E48CD}">
+      <dsp:nvSpPr>
+        <dsp:cNvPr id="0" name=""/>
+        <dsp:cNvSpPr/>
+      </dsp:nvSpPr>
+      <dsp:spPr>
+        <a:xfrm rot="5400000">
+          <a:off x="1118889" y="1865907"/>
+          <a:ext cx="276820" cy="332184"/>
+        </a:xfrm>
+        <a:prstGeom prst="rightArrow">
+          <a:avLst>
+            <a:gd name="adj1" fmla="val 60000"/>
+            <a:gd name="adj2" fmla="val 50000"/>
+          </a:avLst>
+        </a:prstGeom>
+        <a:solidFill>
+          <a:schemeClr val="accent1">
+            <a:tint val="60000"/>
+            <a:hueOff val="0"/>
+            <a:satOff val="0"/>
+            <a:lumOff val="0"/>
+            <a:alphaOff val="0"/>
+          </a:schemeClr>
+        </a:solidFill>
+        <a:ln>
+          <a:noFill/>
+        </a:ln>
+        <a:effectLst/>
+      </dsp:spPr>
+      <dsp:style>
+        <a:lnRef idx="0">
+          <a:scrgbClr r="0" g="0" b="0"/>
+        </a:lnRef>
+        <a:fillRef idx="1">
+          <a:scrgbClr r="0" g="0" b="0"/>
+        </a:fillRef>
+        <a:effectRef idx="0">
+          <a:scrgbClr r="0" g="0" b="0"/>
+        </a:effectRef>
+        <a:fontRef idx="minor">
+          <a:schemeClr val="lt1"/>
+        </a:fontRef>
+      </dsp:style>
+      <dsp:txBody>
+        <a:bodyPr spcFirstLastPara="0" vert="horz" wrap="square" lIns="0" tIns="0" rIns="0" bIns="0" numCol="1" spcCol="1270" anchor="ctr" anchorCtr="0">
+          <a:noAutofit/>
+        </a:bodyPr>
+        <a:lstStyle/>
+        <a:p>
+          <a:pPr lvl="0" algn="ctr" defTabSz="622300">
+            <a:lnSpc>
+              <a:spcPct val="90000"/>
+            </a:lnSpc>
+            <a:spcBef>
+              <a:spcPct val="0"/>
+            </a:spcBef>
+            <a:spcAft>
+              <a:spcPct val="35000"/>
+            </a:spcAft>
+          </a:pPr>
+          <a:endParaRPr lang="en-US" sz="1400" kern="1200"/>
+        </a:p>
+      </dsp:txBody>
+      <dsp:txXfrm rot="-5400000">
+        <a:off x="1157644" y="1893589"/>
+        <a:ext cx="199310" cy="193774"/>
+      </dsp:txXfrm>
+    </dsp:sp>
+    <dsp:sp modelId="{4DA5EE49-8168-4D22-9537-7BE4A3708548}">
+      <dsp:nvSpPr>
+        <dsp:cNvPr id="0" name=""/>
+        <dsp:cNvSpPr/>
+      </dsp:nvSpPr>
+      <dsp:spPr>
+        <a:xfrm>
+          <a:off x="380413" y="2216546"/>
+          <a:ext cx="1753772" cy="738187"/>
+        </a:xfrm>
+        <a:prstGeom prst="roundRect">
+          <a:avLst>
+            <a:gd name="adj" fmla="val 10000"/>
+          </a:avLst>
+        </a:prstGeom>
+        <a:solidFill>
+          <a:schemeClr val="accent1">
+            <a:hueOff val="0"/>
+            <a:satOff val="0"/>
+            <a:lumOff val="0"/>
+            <a:alphaOff val="0"/>
+          </a:schemeClr>
+        </a:solidFill>
+        <a:ln w="25400" cap="flat" cmpd="sng" algn="ctr">
+          <a:solidFill>
+            <a:schemeClr val="lt1">
+              <a:hueOff val="0"/>
+              <a:satOff val="0"/>
+              <a:lumOff val="0"/>
+              <a:alphaOff val="0"/>
+            </a:schemeClr>
+          </a:solidFill>
+          <a:prstDash val="solid"/>
+        </a:ln>
+        <a:effectLst/>
+      </dsp:spPr>
+      <dsp:style>
+        <a:lnRef idx="2">
+          <a:scrgbClr r="0" g="0" b="0"/>
+        </a:lnRef>
+        <a:fillRef idx="1">
+          <a:scrgbClr r="0" g="0" b="0"/>
+        </a:fillRef>
+        <a:effectRef idx="0">
+          <a:scrgbClr r="0" g="0" b="0"/>
+        </a:effectRef>
+        <a:fontRef idx="minor">
+          <a:schemeClr val="lt1"/>
+        </a:fontRef>
+      </dsp:style>
+      <dsp:txBody>
+        <a:bodyPr spcFirstLastPara="0" vert="horz" wrap="square" lIns="68580" tIns="68580" rIns="68580" bIns="68580" numCol="1" spcCol="1270" anchor="ctr" anchorCtr="0">
+          <a:noAutofit/>
+        </a:bodyPr>
+        <a:lstStyle/>
+        <a:p>
+          <a:pPr lvl="0" algn="ctr" defTabSz="800100">
+            <a:lnSpc>
+              <a:spcPct val="90000"/>
+            </a:lnSpc>
+            <a:spcBef>
+              <a:spcPct val="0"/>
+            </a:spcBef>
+            <a:spcAft>
+              <a:spcPct val="35000"/>
+            </a:spcAft>
+          </a:pPr>
+          <a:r>
+            <a:rPr lang="en-US" sz="1800" b="1" kern="1200" dirty="0" smtClean="0">
+              <a:latin typeface="Calibri" pitchFamily="34" charset="0"/>
+            </a:rPr>
+            <a:t>Implementation</a:t>
+          </a:r>
+          <a:endParaRPr lang="en-US" sz="1800" b="1" kern="1200" dirty="0"/>
+        </a:p>
+      </dsp:txBody>
+      <dsp:txXfrm>
+        <a:off x="402034" y="2238167"/>
+        <a:ext cx="1710530" cy="694945"/>
+      </dsp:txXfrm>
+    </dsp:sp>
+    <dsp:sp modelId="{7876155E-F8DD-4EF2-AD82-9C7F7224B37D}">
+      <dsp:nvSpPr>
+        <dsp:cNvPr id="0" name=""/>
+        <dsp:cNvSpPr/>
+      </dsp:nvSpPr>
+      <dsp:spPr>
+        <a:xfrm rot="5400000">
+          <a:off x="1118889" y="2973189"/>
+          <a:ext cx="276820" cy="332184"/>
+        </a:xfrm>
+        <a:prstGeom prst="rightArrow">
+          <a:avLst>
+            <a:gd name="adj1" fmla="val 60000"/>
+            <a:gd name="adj2" fmla="val 50000"/>
+          </a:avLst>
+        </a:prstGeom>
+        <a:solidFill>
+          <a:schemeClr val="accent1">
+            <a:tint val="60000"/>
+            <a:hueOff val="0"/>
+            <a:satOff val="0"/>
+            <a:lumOff val="0"/>
+            <a:alphaOff val="0"/>
+          </a:schemeClr>
+        </a:solidFill>
+        <a:ln>
+          <a:noFill/>
+        </a:ln>
+        <a:effectLst/>
+      </dsp:spPr>
+      <dsp:style>
+        <a:lnRef idx="0">
+          <a:scrgbClr r="0" g="0" b="0"/>
+        </a:lnRef>
+        <a:fillRef idx="1">
+          <a:scrgbClr r="0" g="0" b="0"/>
+        </a:fillRef>
+        <a:effectRef idx="0">
+          <a:scrgbClr r="0" g="0" b="0"/>
+        </a:effectRef>
+        <a:fontRef idx="minor">
+          <a:schemeClr val="lt1"/>
+        </a:fontRef>
+      </dsp:style>
+      <dsp:txBody>
+        <a:bodyPr spcFirstLastPara="0" vert="horz" wrap="square" lIns="0" tIns="0" rIns="0" bIns="0" numCol="1" spcCol="1270" anchor="ctr" anchorCtr="0">
+          <a:noAutofit/>
+        </a:bodyPr>
+        <a:lstStyle/>
+        <a:p>
+          <a:pPr lvl="0" algn="ctr" defTabSz="622300">
+            <a:lnSpc>
+              <a:spcPct val="90000"/>
+            </a:lnSpc>
+            <a:spcBef>
+              <a:spcPct val="0"/>
+            </a:spcBef>
+            <a:spcAft>
+              <a:spcPct val="35000"/>
+            </a:spcAft>
+          </a:pPr>
+          <a:endParaRPr lang="en-US" sz="1400" kern="1200"/>
+        </a:p>
+      </dsp:txBody>
+      <dsp:txXfrm rot="-5400000">
+        <a:off x="1157644" y="3000871"/>
+        <a:ext cx="199310" cy="193774"/>
+      </dsp:txXfrm>
+    </dsp:sp>
+    <dsp:sp modelId="{AE75F7EB-863A-409D-A3CE-B00CBC7A14AA}">
+      <dsp:nvSpPr>
+        <dsp:cNvPr id="0" name=""/>
+        <dsp:cNvSpPr/>
+      </dsp:nvSpPr>
+      <dsp:spPr>
+        <a:xfrm>
+          <a:off x="380413" y="3323828"/>
+          <a:ext cx="1753772" cy="738187"/>
+        </a:xfrm>
+        <a:prstGeom prst="roundRect">
+          <a:avLst>
+            <a:gd name="adj" fmla="val 10000"/>
+          </a:avLst>
+        </a:prstGeom>
+        <a:solidFill>
+          <a:schemeClr val="accent1">
+            <a:hueOff val="0"/>
+            <a:satOff val="0"/>
+            <a:lumOff val="0"/>
+            <a:alphaOff val="0"/>
+          </a:schemeClr>
+        </a:solidFill>
+        <a:ln w="25400" cap="flat" cmpd="sng" algn="ctr">
+          <a:solidFill>
+            <a:schemeClr val="lt1">
+              <a:hueOff val="0"/>
+              <a:satOff val="0"/>
+              <a:lumOff val="0"/>
+              <a:alphaOff val="0"/>
+            </a:schemeClr>
+          </a:solidFill>
+          <a:prstDash val="solid"/>
+        </a:ln>
+        <a:effectLst/>
+      </dsp:spPr>
+      <dsp:style>
+        <a:lnRef idx="2">
+          <a:scrgbClr r="0" g="0" b="0"/>
+        </a:lnRef>
+        <a:fillRef idx="1">
+          <a:scrgbClr r="0" g="0" b="0"/>
+        </a:fillRef>
+        <a:effectRef idx="0">
+          <a:scrgbClr r="0" g="0" b="0"/>
+        </a:effectRef>
+        <a:fontRef idx="minor">
+          <a:schemeClr val="lt1"/>
+        </a:fontRef>
+      </dsp:style>
+      <dsp:txBody>
+        <a:bodyPr spcFirstLastPara="0" vert="horz" wrap="square" lIns="68580" tIns="68580" rIns="68580" bIns="68580" numCol="1" spcCol="1270" anchor="ctr" anchorCtr="0">
+          <a:noAutofit/>
+        </a:bodyPr>
+        <a:lstStyle/>
+        <a:p>
+          <a:pPr lvl="0" algn="ctr" defTabSz="800100">
+            <a:lnSpc>
+              <a:spcPct val="90000"/>
+            </a:lnSpc>
+            <a:spcBef>
+              <a:spcPct val="0"/>
+            </a:spcBef>
+            <a:spcAft>
+              <a:spcPct val="35000"/>
+            </a:spcAft>
+          </a:pPr>
+          <a:r>
+            <a:rPr lang="en-US" sz="1800" b="1" kern="1200" dirty="0" smtClean="0"/>
+            <a:t>Testing</a:t>
+          </a:r>
+          <a:endParaRPr lang="en-US" sz="1800" b="1" kern="1200" dirty="0"/>
+        </a:p>
+      </dsp:txBody>
+      <dsp:txXfrm>
+        <a:off x="402034" y="3345449"/>
+        <a:ext cx="1710530" cy="694945"/>
+      </dsp:txXfrm>
+    </dsp:sp>
   </dsp:spTree>
 </dsp:drawing>
 </file>
 
 <file path=ppt/diagrams/drawing4.xml><?xml version="1.0" encoding="utf-8"?>
-<dsp:drawing xmlns:dgm="http://schemas.openxmlformats.org/drawingml/2006/diagram" xmlns:a="http://schemas.openxmlformats.org/drawingml/2006/main" xmlns:dsp="http://schemas.microsoft.com/office/drawing/2008/diagram">
+<dsp:drawing xmlns:dgm="http://schemas.openxmlformats.org/drawingml/2006/diagram" xmlns:dsp="http://schemas.microsoft.com/office/drawing/2008/diagram" xmlns:a="http://schemas.openxmlformats.org/drawingml/2006/main">
   <dsp:spTree>
     <dsp:nvGrpSpPr>
       <dsp:cNvPr id="0" name=""/>
       <dsp:cNvGrpSpPr/>
     </dsp:nvGrpSpPr>
     <dsp:grpSpPr/>
+    <dsp:sp modelId="{715D256F-02F7-4191-B84E-3A4C6CD8FFC5}">
+      <dsp:nvSpPr>
+        <dsp:cNvPr id="0" name=""/>
+        <dsp:cNvSpPr/>
+      </dsp:nvSpPr>
+      <dsp:spPr>
+        <a:xfrm>
+          <a:off x="0" y="1984"/>
+          <a:ext cx="2438400" cy="4060031"/>
+        </a:xfrm>
+        <a:prstGeom prst="roundRect">
+          <a:avLst>
+            <a:gd name="adj" fmla="val 10000"/>
+          </a:avLst>
+        </a:prstGeom>
+        <a:solidFill>
+          <a:schemeClr val="accent1">
+            <a:hueOff val="0"/>
+            <a:satOff val="0"/>
+            <a:lumOff val="0"/>
+            <a:alphaOff val="0"/>
+          </a:schemeClr>
+        </a:solidFill>
+        <a:ln w="25400" cap="flat" cmpd="sng" algn="ctr">
+          <a:solidFill>
+            <a:schemeClr val="lt1">
+              <a:hueOff val="0"/>
+              <a:satOff val="0"/>
+              <a:lumOff val="0"/>
+              <a:alphaOff val="0"/>
+            </a:schemeClr>
+          </a:solidFill>
+          <a:prstDash val="solid"/>
+        </a:ln>
+        <a:effectLst/>
+      </dsp:spPr>
+      <dsp:style>
+        <a:lnRef idx="2">
+          <a:scrgbClr r="0" g="0" b="0"/>
+        </a:lnRef>
+        <a:fillRef idx="1">
+          <a:scrgbClr r="0" g="0" b="0"/>
+        </a:fillRef>
+        <a:effectRef idx="0">
+          <a:scrgbClr r="0" g="0" b="0"/>
+        </a:effectRef>
+        <a:fontRef idx="minor">
+          <a:schemeClr val="lt1"/>
+        </a:fontRef>
+      </dsp:style>
+      <dsp:txBody>
+        <a:bodyPr spcFirstLastPara="0" vert="horz" wrap="square" lIns="110490" tIns="110490" rIns="110490" bIns="110490" numCol="1" spcCol="1270" anchor="ctr" anchorCtr="0">
+          <a:noAutofit/>
+        </a:bodyPr>
+        <a:lstStyle/>
+        <a:p>
+          <a:pPr lvl="0" algn="ctr" defTabSz="1289050">
+            <a:lnSpc>
+              <a:spcPct val="90000"/>
+            </a:lnSpc>
+            <a:spcBef>
+              <a:spcPct val="0"/>
+            </a:spcBef>
+            <a:spcAft>
+              <a:spcPct val="35000"/>
+            </a:spcAft>
+          </a:pPr>
+          <a:r>
+            <a:rPr lang="en-US" sz="2900" kern="1200" dirty="0" smtClean="0">
+              <a:latin typeface="Calibri" pitchFamily="34" charset="0"/>
+            </a:rPr>
+            <a:t>Project Management</a:t>
+          </a:r>
+          <a:endParaRPr lang="en-US" sz="2900" kern="1200" dirty="0"/>
+        </a:p>
+      </dsp:txBody>
+      <dsp:txXfrm>
+        <a:off x="71418" y="73402"/>
+        <a:ext cx="2295564" cy="3917195"/>
+      </dsp:txXfrm>
+    </dsp:sp>
   </dsp:spTree>
 </dsp:drawing>
 </file>
@@ -10527,7 +11232,7 @@
     </p:spTree>
     <p:extLst>
       <p:ext uri="{BB962C8B-B14F-4D97-AF65-F5344CB8AC3E}">
-        <p14:creationId xmlns:p14="http://schemas.microsoft.com/office/powerpoint/2010/main" xmlns="" val="601875911"/>
+        <p14:creationId xmlns:p14="http://schemas.microsoft.com/office/powerpoint/2010/main" val="601875911"/>
       </p:ext>
     </p:extLst>
   </p:cSld>
@@ -10869,7 +11574,7 @@
     </p:spTree>
     <p:extLst>
       <p:ext uri="{BB962C8B-B14F-4D97-AF65-F5344CB8AC3E}">
-        <p14:creationId xmlns:p14="http://schemas.microsoft.com/office/powerpoint/2010/main" xmlns="" val="1461425486"/>
+        <p14:creationId xmlns:p14="http://schemas.microsoft.com/office/powerpoint/2010/main" val="1461425486"/>
       </p:ext>
     </p:extLst>
   </p:cSld>
@@ -11084,7 +11789,7 @@
 </file>
 
 <file path=ppt/slideLayouts/slideLayout1.xml><?xml version="1.0" encoding="utf-8"?>
-<p:sldLayout xmlns:a="http://schemas.openxmlformats.org/drawingml/2006/main" xmlns:r="http://schemas.openxmlformats.org/officeDocument/2006/relationships" xmlns:p="http://schemas.openxmlformats.org/presentationml/2006/main" showMasterSp="0" type="title" preserve="1">
+<p:sldLayout xmlns:a="http://schemas.openxmlformats.org/drawingml/2006/main" xmlns:r="http://schemas.openxmlformats.org/officeDocument/2006/relationships" xmlns:p="http://schemas.openxmlformats.org/presentationml/2006/main" type="title" preserve="1">
   <p:cSld name="Title Slide">
     <p:spTree>
       <p:nvGrpSpPr>
@@ -14644,9 +15349,24 @@
   <p:cSld>
     <p:bg>
       <p:bgPr>
-        <a:solidFill>
-          <a:schemeClr val="bg1"/>
-        </a:solidFill>
+        <a:gradFill flip="none" rotWithShape="1">
+          <a:gsLst>
+            <a:gs pos="0">
+              <a:srgbClr val="8488C4"/>
+            </a:gs>
+            <a:gs pos="34000">
+              <a:srgbClr val="D4DEFF"/>
+            </a:gs>
+            <a:gs pos="83000">
+              <a:srgbClr val="D4DEFF"/>
+            </a:gs>
+            <a:gs pos="100000">
+              <a:srgbClr val="96AB94"/>
+            </a:gs>
+          </a:gsLst>
+          <a:lin ang="5400000" scaled="0"/>
+          <a:tileRect/>
+        </a:gradFill>
         <a:effectLst/>
       </p:bgPr>
     </p:bg>
@@ -16535,7 +17255,7 @@
           <a:blip r:embed="rId3" cstate="print">
             <a:extLst>
               <a:ext uri="{28A0092B-C50C-407E-A947-70E740481C1C}">
-                <a14:useLocalDpi xmlns:a14="http://schemas.microsoft.com/office/drawing/2010/main" xmlns="" val="0"/>
+                <a14:useLocalDpi xmlns:a14="http://schemas.microsoft.com/office/drawing/2010/main" val="0"/>
               </a:ext>
             </a:extLst>
           </a:blip>
@@ -16546,8 +17266,8 @@
         </p:blipFill>
         <p:spPr bwMode="auto">
           <a:xfrm>
-            <a:off x="316651" y="2971800"/>
-            <a:ext cx="1969349" cy="1965434"/>
+            <a:off x="316651" y="2971799"/>
+            <a:ext cx="2350349" cy="2345677"/>
           </a:xfrm>
           <a:prstGeom prst="rect">
             <a:avLst/>
@@ -16555,7 +17275,7 @@
           <a:noFill/>
           <a:extLst>
             <a:ext uri="{909E8E84-426E-40DD-AFC4-6F175D3DCCD1}">
-              <a14:hiddenFill xmlns:a14="http://schemas.microsoft.com/office/drawing/2010/main" xmlns="">
+              <a14:hiddenFill xmlns:a14="http://schemas.microsoft.com/office/drawing/2010/main">
                 <a:solidFill>
                   <a:srgbClr val="FFFFFF"/>
                 </a:solidFill>
@@ -16576,8 +17296,8 @@
         </p:nvSpPr>
         <p:spPr>
           <a:xfrm>
-            <a:off x="381000" y="1295400"/>
-            <a:ext cx="7086600" cy="1470025"/>
+            <a:off x="381000" y="1143000"/>
+            <a:ext cx="7162800" cy="1622425"/>
           </a:xfrm>
         </p:spPr>
         <p:txBody>
@@ -16616,7 +17336,7 @@
           <a:lstStyle/>
           <a:p>
             <a:r>
-              <a:rPr lang="en-US" sz="2400" b="1" dirty="0">
+              <a:rPr lang="en-US" sz="2400" b="1" dirty="0" smtClean="0">
                 <a:solidFill>
                   <a:schemeClr val="accent4">
                     <a:lumMod val="75000"/>
@@ -16624,10 +17344,12 @@
                   </a:schemeClr>
                 </a:solidFill>
               </a:rPr>
-              <a:t>Presented by </a:t>
+              <a:t>Implementation Phase</a:t>
             </a:r>
+          </a:p>
+          <a:p>
             <a:r>
-              <a:rPr lang="en-US" sz="2400" b="1" dirty="0" smtClean="0">
+              <a:rPr lang="en-US" sz="2400" b="1" dirty="0">
                 <a:solidFill>
                   <a:schemeClr val="accent4">
                     <a:lumMod val="75000"/>
@@ -16637,6 +17359,8 @@
               </a:rPr>
               <a:t>Team SE18-08S</a:t>
             </a:r>
+          </a:p>
+          <a:p>
             <a:endParaRPr lang="en-US" sz="2400" b="1" dirty="0">
               <a:solidFill>
                 <a:schemeClr val="accent4">
@@ -16758,7 +17482,7 @@
           <a:blip r:embed="rId2" cstate="print">
             <a:extLst>
               <a:ext uri="{28A0092B-C50C-407E-A947-70E740481C1C}">
-                <a14:useLocalDpi xmlns:a14="http://schemas.microsoft.com/office/drawing/2010/main" xmlns="" val="0"/>
+                <a14:useLocalDpi xmlns:a14="http://schemas.microsoft.com/office/drawing/2010/main" val="0"/>
               </a:ext>
             </a:extLst>
           </a:blip>
@@ -16781,14 +17505,14 @@
           </a:ln>
           <a:extLst>
             <a:ext uri="{909E8E84-426E-40DD-AFC4-6F175D3DCCD1}">
-              <a14:hiddenFill xmlns:a14="http://schemas.microsoft.com/office/drawing/2010/main" xmlns="">
+              <a14:hiddenFill xmlns:a14="http://schemas.microsoft.com/office/drawing/2010/main">
                 <a:solidFill>
                   <a:srgbClr val="FFFFFF"/>
                 </a:solidFill>
               </a14:hiddenFill>
             </a:ext>
             <a:ext uri="{91240B29-F687-4F45-9708-019B960494DF}">
-              <a14:hiddenLine xmlns:a14="http://schemas.microsoft.com/office/drawing/2010/main" xmlns="" w="9525">
+              <a14:hiddenLine xmlns:a14="http://schemas.microsoft.com/office/drawing/2010/main" w="9525">
                 <a:solidFill>
                   <a:srgbClr val="000000"/>
                 </a:solidFill>
@@ -16803,7 +17527,7 @@
     </p:spTree>
     <p:extLst>
       <p:ext uri="{BB962C8B-B14F-4D97-AF65-F5344CB8AC3E}">
-        <p14:creationId xmlns:p14="http://schemas.microsoft.com/office/powerpoint/2010/main" xmlns="" val="3749085125"/>
+        <p14:creationId xmlns:p14="http://schemas.microsoft.com/office/powerpoint/2010/main" val="3749085125"/>
       </p:ext>
     </p:extLst>
   </p:cSld>
@@ -16926,7 +17650,7 @@
           <a:blip r:embed="rId2" cstate="print">
             <a:extLst>
               <a:ext uri="{28A0092B-C50C-407E-A947-70E740481C1C}">
-                <a14:useLocalDpi xmlns:a14="http://schemas.microsoft.com/office/drawing/2010/main" xmlns="" val="0"/>
+                <a14:useLocalDpi xmlns:a14="http://schemas.microsoft.com/office/drawing/2010/main" val="0"/>
               </a:ext>
             </a:extLst>
           </a:blip>
@@ -16949,14 +17673,14 @@
           </a:ln>
           <a:extLst>
             <a:ext uri="{909E8E84-426E-40DD-AFC4-6F175D3DCCD1}">
-              <a14:hiddenFill xmlns:a14="http://schemas.microsoft.com/office/drawing/2010/main" xmlns="">
+              <a14:hiddenFill xmlns:a14="http://schemas.microsoft.com/office/drawing/2010/main">
                 <a:solidFill>
                   <a:srgbClr val="FFFFFF"/>
                 </a:solidFill>
               </a14:hiddenFill>
             </a:ext>
             <a:ext uri="{91240B29-F687-4F45-9708-019B960494DF}">
-              <a14:hiddenLine xmlns:a14="http://schemas.microsoft.com/office/drawing/2010/main" xmlns="" w="9525">
+              <a14:hiddenLine xmlns:a14="http://schemas.microsoft.com/office/drawing/2010/main" w="9525">
                 <a:solidFill>
                   <a:srgbClr val="000000"/>
                 </a:solidFill>
@@ -16971,7 +17695,7 @@
     </p:spTree>
     <p:extLst>
       <p:ext uri="{BB962C8B-B14F-4D97-AF65-F5344CB8AC3E}">
-        <p14:creationId xmlns:p14="http://schemas.microsoft.com/office/powerpoint/2010/main" xmlns="" val="771240794"/>
+        <p14:creationId xmlns:p14="http://schemas.microsoft.com/office/powerpoint/2010/main" val="771240794"/>
       </p:ext>
     </p:extLst>
   </p:cSld>
@@ -17075,7 +17799,7 @@
           <a:blip r:embed="rId2" cstate="print">
             <a:extLst>
               <a:ext uri="{28A0092B-C50C-407E-A947-70E740481C1C}">
-                <a14:useLocalDpi xmlns:a14="http://schemas.microsoft.com/office/drawing/2010/main" xmlns="" val="0"/>
+                <a14:useLocalDpi xmlns:a14="http://schemas.microsoft.com/office/drawing/2010/main" val="0"/>
               </a:ext>
             </a:extLst>
           </a:blip>
@@ -17098,14 +17822,14 @@
           </a:ln>
           <a:extLst>
             <a:ext uri="{909E8E84-426E-40DD-AFC4-6F175D3DCCD1}">
-              <a14:hiddenFill xmlns:a14="http://schemas.microsoft.com/office/drawing/2010/main" xmlns="">
+              <a14:hiddenFill xmlns:a14="http://schemas.microsoft.com/office/drawing/2010/main">
                 <a:solidFill>
                   <a:srgbClr val="FFFFFF"/>
                 </a:solidFill>
               </a14:hiddenFill>
             </a:ext>
             <a:ext uri="{91240B29-F687-4F45-9708-019B960494DF}">
-              <a14:hiddenLine xmlns:a14="http://schemas.microsoft.com/office/drawing/2010/main" xmlns="" w="9525">
+              <a14:hiddenLine xmlns:a14="http://schemas.microsoft.com/office/drawing/2010/main" w="9525">
                 <a:solidFill>
                   <a:srgbClr val="000000"/>
                 </a:solidFill>
@@ -17120,7 +17844,7 @@
     </p:spTree>
     <p:extLst>
       <p:ext uri="{BB962C8B-B14F-4D97-AF65-F5344CB8AC3E}">
-        <p14:creationId xmlns:p14="http://schemas.microsoft.com/office/powerpoint/2010/main" xmlns="" val="478887766"/>
+        <p14:creationId xmlns:p14="http://schemas.microsoft.com/office/powerpoint/2010/main" val="478887766"/>
       </p:ext>
     </p:extLst>
   </p:cSld>
@@ -17382,7 +18106,7 @@
     </p:spTree>
     <p:extLst>
       <p:ext uri="{BB962C8B-B14F-4D97-AF65-F5344CB8AC3E}">
-        <p14:creationId xmlns:p14="http://schemas.microsoft.com/office/powerpoint/2010/main" xmlns="" val="4091434407"/>
+        <p14:creationId xmlns:p14="http://schemas.microsoft.com/office/powerpoint/2010/main" val="4091434407"/>
       </p:ext>
     </p:extLst>
   </p:cSld>
@@ -17458,7 +18182,7 @@
           <a:blip r:embed="rId2" cstate="print">
             <a:extLst>
               <a:ext uri="{28A0092B-C50C-407E-A947-70E740481C1C}">
-                <a14:useLocalDpi xmlns:a14="http://schemas.microsoft.com/office/drawing/2010/main" xmlns="" val="0"/>
+                <a14:useLocalDpi xmlns:a14="http://schemas.microsoft.com/office/drawing/2010/main" val="0"/>
               </a:ext>
             </a:extLst>
           </a:blip>
@@ -17481,14 +18205,14 @@
           </a:ln>
           <a:extLst>
             <a:ext uri="{909E8E84-426E-40DD-AFC4-6F175D3DCCD1}">
-              <a14:hiddenFill xmlns:a14="http://schemas.microsoft.com/office/drawing/2010/main" xmlns="">
+              <a14:hiddenFill xmlns:a14="http://schemas.microsoft.com/office/drawing/2010/main">
                 <a:solidFill>
                   <a:srgbClr val="FFFFFF"/>
                 </a:solidFill>
               </a14:hiddenFill>
             </a:ext>
             <a:ext uri="{91240B29-F687-4F45-9708-019B960494DF}">
-              <a14:hiddenLine xmlns:a14="http://schemas.microsoft.com/office/drawing/2010/main" xmlns="" w="9525">
+              <a14:hiddenLine xmlns:a14="http://schemas.microsoft.com/office/drawing/2010/main" w="9525">
                 <a:solidFill>
                   <a:srgbClr val="000000"/>
                 </a:solidFill>
@@ -17544,7 +18268,7 @@
           <a:blip r:embed="rId2" cstate="print">
             <a:extLst>
               <a:ext uri="{28A0092B-C50C-407E-A947-70E740481C1C}">
-                <a14:useLocalDpi xmlns:a14="http://schemas.microsoft.com/office/drawing/2010/main" xmlns="" val="0"/>
+                <a14:useLocalDpi xmlns:a14="http://schemas.microsoft.com/office/drawing/2010/main" val="0"/>
               </a:ext>
             </a:extLst>
           </a:blip>
@@ -17568,14 +18292,14 @@
           <a:effectLst/>
           <a:extLst>
             <a:ext uri="{909E8E84-426E-40DD-AFC4-6F175D3DCCD1}">
-              <a14:hiddenFill xmlns:a14="http://schemas.microsoft.com/office/drawing/2010/main" xmlns="">
+              <a14:hiddenFill xmlns:a14="http://schemas.microsoft.com/office/drawing/2010/main">
                 <a:solidFill>
                   <a:schemeClr val="accent1"/>
                 </a:solidFill>
               </a14:hiddenFill>
             </a:ext>
             <a:ext uri="{91240B29-F687-4F45-9708-019B960494DF}">
-              <a14:hiddenLine xmlns:a14="http://schemas.microsoft.com/office/drawing/2010/main" xmlns="" w="9525">
+              <a14:hiddenLine xmlns:a14="http://schemas.microsoft.com/office/drawing/2010/main" w="9525">
                 <a:solidFill>
                   <a:schemeClr val="tx1"/>
                 </a:solidFill>
@@ -17585,7 +18309,7 @@
               </a14:hiddenLine>
             </a:ext>
             <a:ext uri="{AF507438-7753-43E0-B8FC-AC1667EBCBE1}">
-              <a14:hiddenEffects xmlns:a14="http://schemas.microsoft.com/office/drawing/2010/main" xmlns="">
+              <a14:hiddenEffects xmlns:a14="http://schemas.microsoft.com/office/drawing/2010/main">
                 <a:effectLst>
                   <a:outerShdw dist="35921" dir="2700000" algn="ctr" rotWithShape="0">
                     <a:schemeClr val="bg2"/>
@@ -17779,7 +18503,7 @@
     </p:spTree>
     <p:extLst>
       <p:ext uri="{BB962C8B-B14F-4D97-AF65-F5344CB8AC3E}">
-        <p14:creationId xmlns:p14="http://schemas.microsoft.com/office/powerpoint/2010/main" xmlns="" val="3187625084"/>
+        <p14:creationId xmlns:p14="http://schemas.microsoft.com/office/powerpoint/2010/main" val="3187625084"/>
       </p:ext>
     </p:extLst>
   </p:cSld>
@@ -17855,7 +18579,7 @@
           <a:blip r:embed="rId2" cstate="print">
             <a:extLst>
               <a:ext uri="{28A0092B-C50C-407E-A947-70E740481C1C}">
-                <a14:useLocalDpi xmlns:a14="http://schemas.microsoft.com/office/drawing/2010/main" xmlns="" val="0"/>
+                <a14:useLocalDpi xmlns:a14="http://schemas.microsoft.com/office/drawing/2010/main" val="0"/>
               </a:ext>
             </a:extLst>
           </a:blip>
@@ -17879,14 +18603,14 @@
           <a:effectLst/>
           <a:extLst>
             <a:ext uri="{909E8E84-426E-40DD-AFC4-6F175D3DCCD1}">
-              <a14:hiddenFill xmlns:a14="http://schemas.microsoft.com/office/drawing/2010/main" xmlns="">
+              <a14:hiddenFill xmlns:a14="http://schemas.microsoft.com/office/drawing/2010/main">
                 <a:solidFill>
                   <a:schemeClr val="accent1"/>
                 </a:solidFill>
               </a14:hiddenFill>
             </a:ext>
             <a:ext uri="{91240B29-F687-4F45-9708-019B960494DF}">
-              <a14:hiddenLine xmlns:a14="http://schemas.microsoft.com/office/drawing/2010/main" xmlns="" w="9525">
+              <a14:hiddenLine xmlns:a14="http://schemas.microsoft.com/office/drawing/2010/main" w="9525">
                 <a:solidFill>
                   <a:schemeClr val="tx1"/>
                 </a:solidFill>
@@ -17896,7 +18620,7 @@
               </a14:hiddenLine>
             </a:ext>
             <a:ext uri="{AF507438-7753-43E0-B8FC-AC1667EBCBE1}">
-              <a14:hiddenEffects xmlns:a14="http://schemas.microsoft.com/office/drawing/2010/main" xmlns="">
+              <a14:hiddenEffects xmlns:a14="http://schemas.microsoft.com/office/drawing/2010/main">
                 <a:effectLst>
                   <a:outerShdw dist="35921" dir="2700000" algn="ctr" rotWithShape="0">
                     <a:schemeClr val="bg2"/>
@@ -17910,7 +18634,7 @@
     </p:spTree>
     <p:extLst>
       <p:ext uri="{BB962C8B-B14F-4D97-AF65-F5344CB8AC3E}">
-        <p14:creationId xmlns:p14="http://schemas.microsoft.com/office/powerpoint/2010/main" xmlns="" val="1486874553"/>
+        <p14:creationId xmlns:p14="http://schemas.microsoft.com/office/powerpoint/2010/main" val="1486874553"/>
       </p:ext>
     </p:extLst>
   </p:cSld>
@@ -18139,7 +18863,7 @@
     </p:spTree>
     <p:extLst>
       <p:ext uri="{BB962C8B-B14F-4D97-AF65-F5344CB8AC3E}">
-        <p14:creationId xmlns:p14="http://schemas.microsoft.com/office/powerpoint/2010/main" xmlns="" val="1486421255"/>
+        <p14:creationId xmlns:p14="http://schemas.microsoft.com/office/powerpoint/2010/main" val="1486421255"/>
       </p:ext>
     </p:extLst>
   </p:cSld>
@@ -18231,7 +18955,7 @@
           <a:blip r:embed="rId2" cstate="print">
             <a:extLst>
               <a:ext uri="{28A0092B-C50C-407E-A947-70E740481C1C}">
-                <a14:useLocalDpi xmlns:a14="http://schemas.microsoft.com/office/drawing/2010/main" xmlns="" val="0"/>
+                <a14:useLocalDpi xmlns:a14="http://schemas.microsoft.com/office/drawing/2010/main" val="0"/>
               </a:ext>
             </a:extLst>
           </a:blip>
@@ -18251,7 +18975,7 @@
           <a:noFill/>
           <a:extLst>
             <a:ext uri="{909E8E84-426E-40DD-AFC4-6F175D3DCCD1}">
-              <a14:hiddenFill xmlns:a14="http://schemas.microsoft.com/office/drawing/2010/main" xmlns="">
+              <a14:hiddenFill xmlns:a14="http://schemas.microsoft.com/office/drawing/2010/main">
                 <a:solidFill>
                   <a:srgbClr val="FFFFFF"/>
                 </a:solidFill>
@@ -18263,7 +18987,7 @@
     </p:spTree>
     <p:extLst>
       <p:ext uri="{BB962C8B-B14F-4D97-AF65-F5344CB8AC3E}">
-        <p14:creationId xmlns:p14="http://schemas.microsoft.com/office/powerpoint/2010/main" xmlns="" val="1357882309"/>
+        <p14:creationId xmlns:p14="http://schemas.microsoft.com/office/powerpoint/2010/main" val="1357882309"/>
       </p:ext>
     </p:extLst>
   </p:cSld>
@@ -18464,7 +19188,7 @@
     </p:spTree>
     <p:extLst>
       <p:ext uri="{BB962C8B-B14F-4D97-AF65-F5344CB8AC3E}">
-        <p14:creationId xmlns:p14="http://schemas.microsoft.com/office/powerpoint/2010/main" xmlns="" val="1189294953"/>
+        <p14:creationId xmlns:p14="http://schemas.microsoft.com/office/powerpoint/2010/main" val="1189294953"/>
       </p:ext>
     </p:extLst>
   </p:cSld>
@@ -18546,7 +19270,11 @@
               <a:buChar char="v"/>
             </a:pPr>
             <a:r>
-              <a:rPr lang="en-US" b="1" dirty="0"/>
+              <a:rPr lang="en-US" b="1" dirty="0">
+                <a:solidFill>
+                  <a:schemeClr val="tx2"/>
+                </a:solidFill>
+              </a:rPr>
               <a:t>Project Revisit</a:t>
             </a:r>
           </a:p>
@@ -18556,29 +19284,87 @@
               <a:buChar char="v"/>
             </a:pPr>
             <a:r>
-              <a:rPr lang="en-US" dirty="0">
+              <a:rPr lang="en-US" b="1" dirty="0" smtClean="0">
                 <a:solidFill>
                   <a:schemeClr val="bg1">
-                    <a:lumMod val="75000"/>
+                    <a:lumMod val="65000"/>
                   </a:schemeClr>
                 </a:solidFill>
               </a:rPr>
-              <a:t>Use Case </a:t>
+              <a:t>Design &amp; Architecture</a:t>
             </a:r>
+          </a:p>
+          <a:p>
+            <a:pPr>
+              <a:buFont typeface="Wingdings" pitchFamily="2" charset="2"/>
+              <a:buChar char="v"/>
+            </a:pPr>
             <a:r>
-              <a:rPr lang="en-US" dirty="0" smtClean="0">
+              <a:rPr lang="en-US" b="1" dirty="0">
                 <a:solidFill>
                   <a:schemeClr val="bg1">
-                    <a:lumMod val="75000"/>
+                    <a:lumMod val="65000"/>
                   </a:schemeClr>
                 </a:solidFill>
               </a:rPr>
-              <a:t>Modeling</a:t>
+              <a:t>Detailed Design</a:t>
             </a:r>
-            <a:endParaRPr lang="en-US" dirty="0">
+          </a:p>
+          <a:p>
+            <a:pPr>
+              <a:buFont typeface="Wingdings" pitchFamily="2" charset="2"/>
+              <a:buChar char="v"/>
+            </a:pPr>
+            <a:r>
+              <a:rPr lang="en-US" b="1" dirty="0" smtClean="0">
+                <a:solidFill>
+                  <a:schemeClr val="bg1">
+                    <a:lumMod val="65000"/>
+                  </a:schemeClr>
+                </a:solidFill>
+              </a:rPr>
+              <a:t>Development Strategy</a:t>
+            </a:r>
+          </a:p>
+          <a:p>
+            <a:pPr>
+              <a:buFont typeface="Wingdings" pitchFamily="2" charset="2"/>
+              <a:buChar char="v"/>
+            </a:pPr>
+            <a:r>
+              <a:rPr lang="en-US" b="1" dirty="0" smtClean="0">
+                <a:solidFill>
+                  <a:schemeClr val="bg1">
+                    <a:lumMod val="65000"/>
+                  </a:schemeClr>
+                </a:solidFill>
+              </a:rPr>
+              <a:t>Demo </a:t>
+            </a:r>
+            <a:r>
+              <a:rPr lang="en-US" b="1" dirty="0" smtClean="0">
+                <a:solidFill>
+                  <a:schemeClr val="bg1">
+                    <a:lumMod val="65000"/>
+                  </a:schemeClr>
+                </a:solidFill>
+              </a:rPr>
+              <a:t>of </a:t>
+            </a:r>
+            <a:r>
+              <a:rPr lang="en-US" b="1" dirty="0" smtClean="0">
+                <a:solidFill>
+                  <a:schemeClr val="bg1">
+                    <a:lumMod val="65000"/>
+                  </a:schemeClr>
+                </a:solidFill>
+              </a:rPr>
+              <a:t>Product</a:t>
+            </a:r>
+            <a:endParaRPr lang="en-US" b="1" dirty="0" smtClean="0">
               <a:solidFill>
                 <a:schemeClr val="bg1">
-                  <a:lumMod val="75000"/>
+                  <a:lumMod val="65000"/>
                 </a:schemeClr>
               </a:solidFill>
             </a:endParaRPr>
@@ -18589,15 +19375,42 @@
               <a:buChar char="v"/>
             </a:pPr>
             <a:r>
-              <a:rPr lang="en-US" dirty="0" smtClean="0">
+              <a:rPr lang="en-US" b="1" dirty="0" smtClean="0">
                 <a:solidFill>
                   <a:schemeClr val="bg1">
-                    <a:lumMod val="75000"/>
+                    <a:lumMod val="65000"/>
                   </a:schemeClr>
                 </a:solidFill>
               </a:rPr>
-              <a:t>Software Architecture</a:t>
+              <a:t>Project </a:t>
             </a:r>
+            <a:r>
+              <a:rPr lang="en-US" b="1" dirty="0" err="1" smtClean="0">
+                <a:solidFill>
+                  <a:schemeClr val="bg1">
+                    <a:lumMod val="65000"/>
+                  </a:schemeClr>
+                </a:solidFill>
+              </a:rPr>
+              <a:t>Mgmt</a:t>
+            </a:r>
+            <a:r>
+              <a:rPr lang="en-US" b="1" dirty="0" smtClean="0">
+                <a:solidFill>
+                  <a:schemeClr val="bg1">
+                    <a:lumMod val="65000"/>
+                  </a:schemeClr>
+                </a:solidFill>
+              </a:rPr>
+              <a:t> Report</a:t>
+            </a:r>
+            <a:endParaRPr lang="en-US" b="1" dirty="0" smtClean="0">
+              <a:solidFill>
+                <a:schemeClr val="bg1">
+                  <a:lumMod val="65000"/>
+                </a:schemeClr>
+              </a:solidFill>
+            </a:endParaRPr>
           </a:p>
           <a:p>
             <a:pPr>
@@ -18605,78 +19418,24 @@
               <a:buChar char="v"/>
             </a:pPr>
             <a:r>
-              <a:rPr lang="en-US" dirty="0" smtClean="0">
+              <a:rPr lang="en-US" b="1" dirty="0" smtClean="0">
                 <a:solidFill>
                   <a:schemeClr val="bg1">
-                    <a:lumMod val="75000"/>
+                    <a:lumMod val="65000"/>
                   </a:schemeClr>
                 </a:solidFill>
               </a:rPr>
-              <a:t>Demo of Prototype</a:t>
+              <a:t>Q </a:t>
             </a:r>
-          </a:p>
-          <a:p>
-            <a:pPr>
-              <a:buFont typeface="Wingdings" pitchFamily="2" charset="2"/>
-              <a:buChar char="v"/>
-            </a:pPr>
             <a:r>
-              <a:rPr lang="en-US" dirty="0" smtClean="0">
+              <a:rPr lang="en-US" b="1" dirty="0" smtClean="0">
                 <a:solidFill>
                   <a:schemeClr val="bg1">
-                    <a:lumMod val="75000"/>
+                    <a:lumMod val="65000"/>
                   </a:schemeClr>
                 </a:solidFill>
               </a:rPr>
-              <a:t>Transition Strategy</a:t>
-            </a:r>
-          </a:p>
-          <a:p>
-            <a:pPr>
-              <a:buFont typeface="Wingdings" pitchFamily="2" charset="2"/>
-              <a:buChar char="v"/>
-            </a:pPr>
-            <a:r>
-              <a:rPr lang="en-US" dirty="0" smtClean="0">
-                <a:solidFill>
-                  <a:schemeClr val="bg1">
-                    <a:lumMod val="75000"/>
-                  </a:schemeClr>
-                </a:solidFill>
-              </a:rPr>
-              <a:t>Project Progress</a:t>
-            </a:r>
-          </a:p>
-          <a:p>
-            <a:pPr>
-              <a:buFont typeface="Wingdings" pitchFamily="2" charset="2"/>
-              <a:buChar char="v"/>
-            </a:pPr>
-            <a:r>
-              <a:rPr lang="en-US" dirty="0" smtClean="0">
-                <a:solidFill>
-                  <a:schemeClr val="bg1">
-                    <a:lumMod val="75000"/>
-                  </a:schemeClr>
-                </a:solidFill>
-              </a:rPr>
-              <a:t>Challenges &amp; Problems</a:t>
-            </a:r>
-          </a:p>
-          <a:p>
-            <a:pPr>
-              <a:buFont typeface="Wingdings" pitchFamily="2" charset="2"/>
-              <a:buChar char="v"/>
-            </a:pPr>
-            <a:r>
-              <a:rPr lang="en-US" dirty="0" smtClean="0">
-                <a:solidFill>
-                  <a:schemeClr val="bg1">
-                    <a:lumMod val="75000"/>
-                  </a:schemeClr>
-                </a:solidFill>
-              </a:rPr>
-              <a:t>Q &amp; A</a:t>
+              <a:t>&amp; A</a:t>
             </a:r>
           </a:p>
         </p:txBody>
@@ -18693,7 +19452,7 @@
           <a:blip r:embed="rId2" cstate="print">
             <a:extLst>
               <a:ext uri="{28A0092B-C50C-407E-A947-70E740481C1C}">
-                <a14:useLocalDpi xmlns:a14="http://schemas.microsoft.com/office/drawing/2010/main" xmlns="" val="0"/>
+                <a14:useLocalDpi xmlns:a14="http://schemas.microsoft.com/office/drawing/2010/main" val="0"/>
               </a:ext>
             </a:extLst>
           </a:blip>
@@ -18713,7 +19472,7 @@
           <a:noFill/>
           <a:extLst>
             <a:ext uri="{909E8E84-426E-40DD-AFC4-6F175D3DCCD1}">
-              <a14:hiddenFill xmlns:a14="http://schemas.microsoft.com/office/drawing/2010/main" xmlns="">
+              <a14:hiddenFill xmlns:a14="http://schemas.microsoft.com/office/drawing/2010/main">
                 <a:solidFill>
                   <a:srgbClr val="FFFFFF"/>
                 </a:solidFill>
@@ -18725,7 +19484,7 @@
     </p:spTree>
     <p:extLst>
       <p:ext uri="{BB962C8B-B14F-4D97-AF65-F5344CB8AC3E}">
-        <p14:creationId xmlns:p14="http://schemas.microsoft.com/office/powerpoint/2010/main" xmlns="" val="2651902496"/>
+        <p14:creationId xmlns:p14="http://schemas.microsoft.com/office/powerpoint/2010/main" val="2651902496"/>
       </p:ext>
     </p:extLst>
   </p:cSld>
@@ -18987,7 +19746,7 @@
     </p:spTree>
     <p:extLst>
       <p:ext uri="{BB962C8B-B14F-4D97-AF65-F5344CB8AC3E}">
-        <p14:creationId xmlns:p14="http://schemas.microsoft.com/office/powerpoint/2010/main" xmlns="" val="4091434407"/>
+        <p14:creationId xmlns:p14="http://schemas.microsoft.com/office/powerpoint/2010/main" val="4091434407"/>
       </p:ext>
     </p:extLst>
   </p:cSld>
@@ -19105,7 +19864,7 @@
           <p:nvPr>
             <p:extLst>
               <p:ext uri="{D42A27DB-BD31-4B8C-83A1-F6EECF244321}">
-                <p14:modId xmlns:p14="http://schemas.microsoft.com/office/powerpoint/2010/main" xmlns="" val="3348270388"/>
+                <p14:modId xmlns:p14="http://schemas.microsoft.com/office/powerpoint/2010/main" val="3348270388"/>
               </p:ext>
             </p:extLst>
           </p:nvPr>
@@ -19215,7 +19974,7 @@
           <p:nvPr>
             <p:extLst>
               <p:ext uri="{D42A27DB-BD31-4B8C-83A1-F6EECF244321}">
-                <p14:modId xmlns:p14="http://schemas.microsoft.com/office/powerpoint/2010/main" xmlns="" val="3362897560"/>
+                <p14:modId xmlns:p14="http://schemas.microsoft.com/office/powerpoint/2010/main" val="3362897560"/>
               </p:ext>
             </p:extLst>
           </p:nvPr>
@@ -20400,7 +21159,7 @@
     </p:spTree>
     <p:extLst>
       <p:ext uri="{BB962C8B-B14F-4D97-AF65-F5344CB8AC3E}">
-        <p14:creationId xmlns:p14="http://schemas.microsoft.com/office/powerpoint/2010/main" xmlns="" val="4091434407"/>
+        <p14:creationId xmlns:p14="http://schemas.microsoft.com/office/powerpoint/2010/main" val="4091434407"/>
       </p:ext>
     </p:extLst>
   </p:cSld>
@@ -20467,7 +21226,7 @@
             <p:ph idx="1"/>
             <p:extLst>
               <p:ext uri="{D42A27DB-BD31-4B8C-83A1-F6EECF244321}">
-                <p14:modId xmlns:p14="http://schemas.microsoft.com/office/powerpoint/2010/main" xmlns="" val="1624300151"/>
+                <p14:modId xmlns:p14="http://schemas.microsoft.com/office/powerpoint/2010/main" val="1624300151"/>
               </p:ext>
             </p:extLst>
           </p:nvPr>
@@ -21935,7 +22694,7 @@
           <a:blip r:embed="rId2" cstate="print">
             <a:extLst>
               <a:ext uri="{28A0092B-C50C-407E-A947-70E740481C1C}">
-                <a14:useLocalDpi xmlns:a14="http://schemas.microsoft.com/office/drawing/2010/main" xmlns="" val="0"/>
+                <a14:useLocalDpi xmlns:a14="http://schemas.microsoft.com/office/drawing/2010/main" val="0"/>
               </a:ext>
             </a:extLst>
           </a:blip>
@@ -21955,7 +22714,7 @@
           <a:noFill/>
           <a:extLst>
             <a:ext uri="{909E8E84-426E-40DD-AFC4-6F175D3DCCD1}">
-              <a14:hiddenFill xmlns:a14="http://schemas.microsoft.com/office/drawing/2010/main" xmlns="">
+              <a14:hiddenFill xmlns:a14="http://schemas.microsoft.com/office/drawing/2010/main">
                 <a:solidFill>
                   <a:srgbClr val="FFFFFF"/>
                 </a:solidFill>
@@ -21976,7 +22735,7 @@
           <a:blip r:embed="rId2" cstate="print">
             <a:extLst>
               <a:ext uri="{28A0092B-C50C-407E-A947-70E740481C1C}">
-                <a14:useLocalDpi xmlns:a14="http://schemas.microsoft.com/office/drawing/2010/main" xmlns="" val="0"/>
+                <a14:useLocalDpi xmlns:a14="http://schemas.microsoft.com/office/drawing/2010/main" val="0"/>
               </a:ext>
             </a:extLst>
           </a:blip>
@@ -21996,7 +22755,7 @@
           <a:noFill/>
           <a:extLst>
             <a:ext uri="{909E8E84-426E-40DD-AFC4-6F175D3DCCD1}">
-              <a14:hiddenFill xmlns:a14="http://schemas.microsoft.com/office/drawing/2010/main" xmlns="">
+              <a14:hiddenFill xmlns:a14="http://schemas.microsoft.com/office/drawing/2010/main">
                 <a:solidFill>
                   <a:srgbClr val="FFFFFF"/>
                 </a:solidFill>
@@ -22017,7 +22776,7 @@
           <a:blip r:embed="rId2" cstate="print">
             <a:extLst>
               <a:ext uri="{28A0092B-C50C-407E-A947-70E740481C1C}">
-                <a14:useLocalDpi xmlns:a14="http://schemas.microsoft.com/office/drawing/2010/main" xmlns="" val="0"/>
+                <a14:useLocalDpi xmlns:a14="http://schemas.microsoft.com/office/drawing/2010/main" val="0"/>
               </a:ext>
             </a:extLst>
           </a:blip>
@@ -22037,7 +22796,7 @@
           <a:noFill/>
           <a:extLst>
             <a:ext uri="{909E8E84-426E-40DD-AFC4-6F175D3DCCD1}">
-              <a14:hiddenFill xmlns:a14="http://schemas.microsoft.com/office/drawing/2010/main" xmlns="">
+              <a14:hiddenFill xmlns:a14="http://schemas.microsoft.com/office/drawing/2010/main">
                 <a:solidFill>
                   <a:srgbClr val="FFFFFF"/>
                 </a:solidFill>
@@ -22058,7 +22817,7 @@
           <a:blip r:embed="rId2" cstate="print">
             <a:extLst>
               <a:ext uri="{28A0092B-C50C-407E-A947-70E740481C1C}">
-                <a14:useLocalDpi xmlns:a14="http://schemas.microsoft.com/office/drawing/2010/main" xmlns="" val="0"/>
+                <a14:useLocalDpi xmlns:a14="http://schemas.microsoft.com/office/drawing/2010/main" val="0"/>
               </a:ext>
             </a:extLst>
           </a:blip>
@@ -22078,7 +22837,7 @@
           <a:noFill/>
           <a:extLst>
             <a:ext uri="{909E8E84-426E-40DD-AFC4-6F175D3DCCD1}">
-              <a14:hiddenFill xmlns:a14="http://schemas.microsoft.com/office/drawing/2010/main" xmlns="">
+              <a14:hiddenFill xmlns:a14="http://schemas.microsoft.com/office/drawing/2010/main">
                 <a:solidFill>
                   <a:srgbClr val="FFFFFF"/>
                 </a:solidFill>
@@ -22317,7 +23076,7 @@
           <a:blip r:embed="rId2" cstate="print">
             <a:extLst>
               <a:ext uri="{28A0092B-C50C-407E-A947-70E740481C1C}">
-                <a14:useLocalDpi xmlns:a14="http://schemas.microsoft.com/office/drawing/2010/main" xmlns="" val="0"/>
+                <a14:useLocalDpi xmlns:a14="http://schemas.microsoft.com/office/drawing/2010/main" val="0"/>
               </a:ext>
             </a:extLst>
           </a:blip>
@@ -22337,7 +23096,7 @@
           <a:noFill/>
           <a:extLst>
             <a:ext uri="{909E8E84-426E-40DD-AFC4-6F175D3DCCD1}">
-              <a14:hiddenFill xmlns:a14="http://schemas.microsoft.com/office/drawing/2010/main" xmlns="">
+              <a14:hiddenFill xmlns:a14="http://schemas.microsoft.com/office/drawing/2010/main">
                 <a:solidFill>
                   <a:srgbClr val="FFFFFF"/>
                 </a:solidFill>
@@ -22349,7 +23108,7 @@
     </p:spTree>
     <p:extLst>
       <p:ext uri="{BB962C8B-B14F-4D97-AF65-F5344CB8AC3E}">
-        <p14:creationId xmlns:p14="http://schemas.microsoft.com/office/powerpoint/2010/main" xmlns="" val="4091434407"/>
+        <p14:creationId xmlns:p14="http://schemas.microsoft.com/office/powerpoint/2010/main" val="4091434407"/>
       </p:ext>
     </p:extLst>
   </p:cSld>
@@ -22418,7 +23177,7 @@
           <a:blip r:embed="rId2" cstate="print">
             <a:extLst>
               <a:ext uri="{28A0092B-C50C-407E-A947-70E740481C1C}">
-                <a14:useLocalDpi xmlns:a14="http://schemas.microsoft.com/office/drawing/2010/main" xmlns="" val="0"/>
+                <a14:useLocalDpi xmlns:a14="http://schemas.microsoft.com/office/drawing/2010/main" val="0"/>
               </a:ext>
             </a:extLst>
           </a:blip>
@@ -22442,14 +23201,14 @@
           <a:effectLst/>
           <a:extLst>
             <a:ext uri="{909E8E84-426E-40DD-AFC4-6F175D3DCCD1}">
-              <a14:hiddenFill xmlns:a14="http://schemas.microsoft.com/office/drawing/2010/main" xmlns="">
+              <a14:hiddenFill xmlns:a14="http://schemas.microsoft.com/office/drawing/2010/main">
                 <a:solidFill>
                   <a:schemeClr val="accent1"/>
                 </a:solidFill>
               </a14:hiddenFill>
             </a:ext>
             <a:ext uri="{91240B29-F687-4F45-9708-019B960494DF}">
-              <a14:hiddenLine xmlns:a14="http://schemas.microsoft.com/office/drawing/2010/main" xmlns="" w="9525">
+              <a14:hiddenLine xmlns:a14="http://schemas.microsoft.com/office/drawing/2010/main" w="9525">
                 <a:solidFill>
                   <a:schemeClr val="tx1"/>
                 </a:solidFill>
@@ -22459,7 +23218,7 @@
               </a14:hiddenLine>
             </a:ext>
             <a:ext uri="{AF507438-7753-43E0-B8FC-AC1667EBCBE1}">
-              <a14:hiddenEffects xmlns:a14="http://schemas.microsoft.com/office/drawing/2010/main" xmlns="">
+              <a14:hiddenEffects xmlns:a14="http://schemas.microsoft.com/office/drawing/2010/main">
                 <a:effectLst>
                   <a:outerShdw dist="35921" dir="2700000" algn="ctr" rotWithShape="0">
                     <a:schemeClr val="bg2"/>
@@ -22473,7 +23232,7 @@
     </p:spTree>
     <p:extLst>
       <p:ext uri="{BB962C8B-B14F-4D97-AF65-F5344CB8AC3E}">
-        <p14:creationId xmlns:p14="http://schemas.microsoft.com/office/powerpoint/2010/main" xmlns="" val="923722062"/>
+        <p14:creationId xmlns:p14="http://schemas.microsoft.com/office/powerpoint/2010/main" val="923722062"/>
       </p:ext>
     </p:extLst>
   </p:cSld>
@@ -22711,7 +23470,7 @@
           <a:blip r:embed="rId2" cstate="print">
             <a:extLst>
               <a:ext uri="{28A0092B-C50C-407E-A947-70E740481C1C}">
-                <a14:useLocalDpi xmlns:a14="http://schemas.microsoft.com/office/drawing/2010/main" xmlns="" val="0"/>
+                <a14:useLocalDpi xmlns:a14="http://schemas.microsoft.com/office/drawing/2010/main" val="0"/>
               </a:ext>
             </a:extLst>
           </a:blip>
@@ -22731,7 +23490,7 @@
           <a:noFill/>
           <a:extLst>
             <a:ext uri="{909E8E84-426E-40DD-AFC4-6F175D3DCCD1}">
-              <a14:hiddenFill xmlns:a14="http://schemas.microsoft.com/office/drawing/2010/main" xmlns="">
+              <a14:hiddenFill xmlns:a14="http://schemas.microsoft.com/office/drawing/2010/main">
                 <a:solidFill>
                   <a:srgbClr val="FFFFFF"/>
                 </a:solidFill>
@@ -22743,7 +23502,7 @@
     </p:spTree>
     <p:extLst>
       <p:ext uri="{BB962C8B-B14F-4D97-AF65-F5344CB8AC3E}">
-        <p14:creationId xmlns:p14="http://schemas.microsoft.com/office/powerpoint/2010/main" xmlns="" val="674631353"/>
+        <p14:creationId xmlns:p14="http://schemas.microsoft.com/office/powerpoint/2010/main" val="674631353"/>
       </p:ext>
     </p:extLst>
   </p:cSld>
@@ -22835,7 +23594,7 @@
           <p:nvPr>
             <p:extLst>
               <p:ext uri="{D42A27DB-BD31-4B8C-83A1-F6EECF244321}">
-                <p14:modId xmlns:p14="http://schemas.microsoft.com/office/powerpoint/2010/main" xmlns="" val="1852051571"/>
+                <p14:modId xmlns:p14="http://schemas.microsoft.com/office/powerpoint/2010/main" val="1852051571"/>
               </p:ext>
             </p:extLst>
           </p:nvPr>
@@ -23384,7 +24143,7 @@
           <a:blip r:embed="rId2" cstate="print">
             <a:extLst>
               <a:ext uri="{28A0092B-C50C-407E-A947-70E740481C1C}">
-                <a14:useLocalDpi xmlns:a14="http://schemas.microsoft.com/office/drawing/2010/main" xmlns="" val="0"/>
+                <a14:useLocalDpi xmlns:a14="http://schemas.microsoft.com/office/drawing/2010/main" val="0"/>
               </a:ext>
             </a:extLst>
           </a:blip>
@@ -23404,7 +24163,7 @@
           <a:noFill/>
           <a:extLst>
             <a:ext uri="{909E8E84-426E-40DD-AFC4-6F175D3DCCD1}">
-              <a14:hiddenFill xmlns:a14="http://schemas.microsoft.com/office/drawing/2010/main" xmlns="">
+              <a14:hiddenFill xmlns:a14="http://schemas.microsoft.com/office/drawing/2010/main">
                 <a:solidFill>
                   <a:srgbClr val="FFFFFF"/>
                 </a:solidFill>
@@ -23416,7 +24175,7 @@
     </p:spTree>
     <p:extLst>
       <p:ext uri="{BB962C8B-B14F-4D97-AF65-F5344CB8AC3E}">
-        <p14:creationId xmlns:p14="http://schemas.microsoft.com/office/powerpoint/2010/main" xmlns="" val="4091434407"/>
+        <p14:creationId xmlns:p14="http://schemas.microsoft.com/office/powerpoint/2010/main" val="4091434407"/>
       </p:ext>
     </p:extLst>
   </p:cSld>
@@ -23483,7 +24242,7 @@
             <p:ph idx="1"/>
             <p:extLst>
               <p:ext uri="{D42A27DB-BD31-4B8C-83A1-F6EECF244321}">
-                <p14:modId xmlns:p14="http://schemas.microsoft.com/office/powerpoint/2010/main" xmlns="" val="1715314121"/>
+                <p14:modId xmlns:p14="http://schemas.microsoft.com/office/powerpoint/2010/main" val="1939026704"/>
               </p:ext>
             </p:extLst>
           </p:nvPr>
@@ -23530,12 +24289,25 @@
             </a:r>
             <a:r>
               <a:rPr lang="en-US" sz="2400" i="1" dirty="0" smtClean="0"/>
-              <a:t>To build a web-based solution to facilitate the process of volunteer registration, project management till retention</a:t>
+              <a:t>To </a:t>
+            </a:r>
+            <a:r>
+              <a:rPr lang="en-US" sz="2400" i="1" dirty="0" smtClean="0"/>
+              <a:t>provide a solution </a:t>
+            </a:r>
+            <a:r>
+              <a:rPr lang="en-US" sz="2400" i="1" dirty="0" smtClean="0"/>
+              <a:t>to facilitate the process of volunteer registration, project </a:t>
+            </a:r>
+            <a:r>
+              <a:rPr lang="en-US" sz="2400" i="1" dirty="0" smtClean="0"/>
+              <a:t>management and certificate management</a:t>
             </a:r>
             <a:r>
               <a:rPr lang="en-US" dirty="0" smtClean="0"/>
               <a:t>.</a:t>
             </a:r>
+            <a:endParaRPr lang="en-US" dirty="0" smtClean="0"/>
           </a:p>
           <a:p>
             <a:pPr marL="457200" indent="-457200">
@@ -23620,7 +24392,7 @@
           <a:blip r:embed="rId2" cstate="print">
             <a:extLst>
               <a:ext uri="{28A0092B-C50C-407E-A947-70E740481C1C}">
-                <a14:useLocalDpi xmlns:a14="http://schemas.microsoft.com/office/drawing/2010/main" xmlns="" val="0"/>
+                <a14:useLocalDpi xmlns:a14="http://schemas.microsoft.com/office/drawing/2010/main" val="0"/>
               </a:ext>
             </a:extLst>
           </a:blip>
@@ -23640,7 +24412,7 @@
           <a:noFill/>
           <a:extLst>
             <a:ext uri="{909E8E84-426E-40DD-AFC4-6F175D3DCCD1}">
-              <a14:hiddenFill xmlns:a14="http://schemas.microsoft.com/office/drawing/2010/main" xmlns="">
+              <a14:hiddenFill xmlns:a14="http://schemas.microsoft.com/office/drawing/2010/main">
                 <a:solidFill>
                   <a:srgbClr val="FFFFFF"/>
                 </a:solidFill>
@@ -23704,165 +24476,6 @@
           </a:p>
         </p:txBody>
       </p:sp>
-      <p:sp>
-        <p:nvSpPr>
-          <p:cNvPr id="22533" name="Rectangle 5"/>
-          <p:cNvSpPr>
-            <a:spLocks noGrp="1" noChangeArrowheads="1"/>
-          </p:cNvSpPr>
-          <p:nvPr>
-            <p:ph type="body" idx="1"/>
-          </p:nvPr>
-        </p:nvSpPr>
-        <p:spPr>
-          <a:xfrm>
-            <a:off x="1143000" y="1524000"/>
-            <a:ext cx="7391400" cy="4648200"/>
-          </a:xfrm>
-        </p:spPr>
-        <p:txBody>
-          <a:bodyPr/>
-          <a:lstStyle/>
-          <a:p>
-            <a:pPr>
-              <a:buFont typeface="Wingdings" pitchFamily="2" charset="2"/>
-              <a:buChar char="v"/>
-            </a:pPr>
-            <a:r>
-              <a:rPr lang="en-US" dirty="0" smtClean="0">
-                <a:solidFill>
-                  <a:schemeClr val="bg1">
-                    <a:lumMod val="75000"/>
-                  </a:schemeClr>
-                </a:solidFill>
-              </a:rPr>
-              <a:t>Project Revisit</a:t>
-            </a:r>
-          </a:p>
-          <a:p>
-            <a:pPr>
-              <a:buFont typeface="Wingdings" pitchFamily="2" charset="2"/>
-              <a:buChar char="v"/>
-            </a:pPr>
-            <a:r>
-              <a:rPr lang="en-US" b="1" dirty="0"/>
-              <a:t>Use Case Modeling</a:t>
-            </a:r>
-          </a:p>
-          <a:p>
-            <a:pPr>
-              <a:buFont typeface="Wingdings" pitchFamily="2" charset="2"/>
-              <a:buChar char="v"/>
-            </a:pPr>
-            <a:r>
-              <a:rPr lang="en-US" dirty="0" smtClean="0">
-                <a:solidFill>
-                  <a:schemeClr val="bg1">
-                    <a:lumMod val="75000"/>
-                  </a:schemeClr>
-                </a:solidFill>
-              </a:rPr>
-              <a:t>Software Architecture</a:t>
-            </a:r>
-          </a:p>
-          <a:p>
-            <a:pPr>
-              <a:buFont typeface="Wingdings" pitchFamily="2" charset="2"/>
-              <a:buChar char="v"/>
-            </a:pPr>
-            <a:r>
-              <a:rPr lang="en-US" dirty="0" smtClean="0">
-                <a:solidFill>
-                  <a:schemeClr val="bg1">
-                    <a:lumMod val="75000"/>
-                  </a:schemeClr>
-                </a:solidFill>
-              </a:rPr>
-              <a:t>Demo of Prototype</a:t>
-            </a:r>
-          </a:p>
-          <a:p>
-            <a:pPr>
-              <a:buFont typeface="Wingdings" pitchFamily="2" charset="2"/>
-              <a:buChar char="v"/>
-            </a:pPr>
-            <a:r>
-              <a:rPr lang="en-US" dirty="0" smtClean="0">
-                <a:solidFill>
-                  <a:schemeClr val="bg1">
-                    <a:lumMod val="75000"/>
-                  </a:schemeClr>
-                </a:solidFill>
-              </a:rPr>
-              <a:t>Transition Strategy</a:t>
-            </a:r>
-          </a:p>
-          <a:p>
-            <a:pPr>
-              <a:buFont typeface="Wingdings" pitchFamily="2" charset="2"/>
-              <a:buChar char="v"/>
-            </a:pPr>
-            <a:r>
-              <a:rPr lang="en-US" dirty="0" smtClean="0">
-                <a:solidFill>
-                  <a:schemeClr val="bg1">
-                    <a:lumMod val="75000"/>
-                  </a:schemeClr>
-                </a:solidFill>
-              </a:rPr>
-              <a:t>Project Progress</a:t>
-            </a:r>
-          </a:p>
-          <a:p>
-            <a:pPr>
-              <a:buFont typeface="Wingdings" pitchFamily="2" charset="2"/>
-              <a:buChar char="v"/>
-            </a:pPr>
-            <a:r>
-              <a:rPr lang="en-US" dirty="0" smtClean="0">
-                <a:solidFill>
-                  <a:schemeClr val="bg1">
-                    <a:lumMod val="75000"/>
-                  </a:schemeClr>
-                </a:solidFill>
-              </a:rPr>
-              <a:t>Development Plan</a:t>
-            </a:r>
-          </a:p>
-          <a:p>
-            <a:pPr>
-              <a:buFont typeface="Wingdings" pitchFamily="2" charset="2"/>
-              <a:buChar char="v"/>
-            </a:pPr>
-            <a:r>
-              <a:rPr lang="en-US" dirty="0" smtClean="0">
-                <a:solidFill>
-                  <a:schemeClr val="bg1">
-                    <a:lumMod val="75000"/>
-                  </a:schemeClr>
-                </a:solidFill>
-              </a:rPr>
-              <a:t>Challenges &amp; Problems</a:t>
-            </a:r>
-          </a:p>
-          <a:p>
-            <a:pPr>
-              <a:buFont typeface="Wingdings" pitchFamily="2" charset="2"/>
-              <a:buChar char="v"/>
-            </a:pPr>
-            <a:r>
-              <a:rPr lang="en-US" dirty="0" smtClean="0">
-                <a:solidFill>
-                  <a:schemeClr val="bg1">
-                    <a:lumMod val="75000"/>
-                  </a:schemeClr>
-                </a:solidFill>
-              </a:rPr>
-              <a:t>Q &amp; A</a:t>
-            </a:r>
-          </a:p>
-        </p:txBody>
-      </p:sp>
       <p:pic>
         <p:nvPicPr>
           <p:cNvPr id="4" name="Picture 3" descr="C:\Users\Dio\AppData\Local\Microsoft\Windows\Temporary Internet Files\Content.IE5\J694V2JJ\MC900330873[1].wmf"/>
@@ -23875,7 +24488,7 @@
           <a:blip r:embed="rId2" cstate="print">
             <a:extLst>
               <a:ext uri="{28A0092B-C50C-407E-A947-70E740481C1C}">
-                <a14:useLocalDpi xmlns:a14="http://schemas.microsoft.com/office/drawing/2010/main" xmlns="" val="0"/>
+                <a14:useLocalDpi xmlns:a14="http://schemas.microsoft.com/office/drawing/2010/main" val="0"/>
               </a:ext>
             </a:extLst>
           </a:blip>
@@ -23895,7 +24508,7 @@
           <a:noFill/>
           <a:extLst>
             <a:ext uri="{909E8E84-426E-40DD-AFC4-6F175D3DCCD1}">
-              <a14:hiddenFill xmlns:a14="http://schemas.microsoft.com/office/drawing/2010/main" xmlns="">
+              <a14:hiddenFill xmlns:a14="http://schemas.microsoft.com/office/drawing/2010/main">
                 <a:solidFill>
                   <a:srgbClr val="FFFFFF"/>
                 </a:solidFill>
@@ -23904,10 +24517,343 @@
           </a:extLst>
         </p:spPr>
       </p:pic>
+      <p:sp>
+        <p:nvSpPr>
+          <p:cNvPr id="7" name="Rectangle 5"/>
+          <p:cNvSpPr txBox="1">
+            <a:spLocks noChangeArrowheads="1"/>
+          </p:cNvSpPr>
+          <p:nvPr/>
+        </p:nvSpPr>
+        <p:spPr bwMode="auto">
+          <a:xfrm>
+            <a:off x="1143000" y="1524000"/>
+            <a:ext cx="7391400" cy="4648200"/>
+          </a:xfrm>
+          <a:prstGeom prst="rect">
+            <a:avLst/>
+          </a:prstGeom>
+          <a:noFill/>
+          <a:ln w="9525">
+            <a:noFill/>
+            <a:miter lim="800000"/>
+            <a:headEnd/>
+            <a:tailEnd/>
+          </a:ln>
+          <a:effectLst/>
+        </p:spPr>
+        <p:txBody>
+          <a:bodyPr vert="horz" wrap="square" lIns="91440" tIns="45720" rIns="91440" bIns="45720" numCol="1" anchor="t" anchorCtr="0" compatLnSpc="1">
+            <a:prstTxWarp prst="textNoShape">
+              <a:avLst/>
+            </a:prstTxWarp>
+          </a:bodyPr>
+          <a:lstStyle>
+            <a:lvl1pPr marL="342900" indent="-342900" algn="l" rtl="0" eaLnBrk="1" fontAlgn="base" hangingPunct="1">
+              <a:spcBef>
+                <a:spcPct val="25000"/>
+              </a:spcBef>
+              <a:spcAft>
+                <a:spcPct val="0"/>
+              </a:spcAft>
+              <a:buClr>
+                <a:schemeClr val="tx2"/>
+              </a:buClr>
+              <a:buSzPct val="60000"/>
+              <a:buFont typeface="Wingdings" pitchFamily="2" charset="2"/>
+              <a:defRPr sz="2700">
+                <a:solidFill>
+                  <a:schemeClr val="tx1"/>
+                </a:solidFill>
+                <a:latin typeface="+mn-lt"/>
+                <a:ea typeface="+mn-ea"/>
+                <a:cs typeface="+mn-cs"/>
+              </a:defRPr>
+            </a:lvl1pPr>
+            <a:lvl2pPr marL="692150" indent="-347663" algn="l" rtl="0" eaLnBrk="1" fontAlgn="base" hangingPunct="1">
+              <a:spcBef>
+                <a:spcPct val="0"/>
+              </a:spcBef>
+              <a:spcAft>
+                <a:spcPct val="25000"/>
+              </a:spcAft>
+              <a:buClr>
+                <a:schemeClr val="accent2"/>
+              </a:buClr>
+              <a:buSzPct val="55000"/>
+              <a:buFont typeface="Wingdings" pitchFamily="2" charset="2"/>
+              <a:buChar char="l"/>
+              <a:defRPr sz="2400">
+                <a:solidFill>
+                  <a:schemeClr val="tx1"/>
+                </a:solidFill>
+                <a:latin typeface="+mn-lt"/>
+              </a:defRPr>
+            </a:lvl2pPr>
+            <a:lvl3pPr marL="987425" indent="-293688" algn="l" rtl="0" eaLnBrk="1" fontAlgn="base" hangingPunct="1">
+              <a:spcBef>
+                <a:spcPct val="0"/>
+              </a:spcBef>
+              <a:spcAft>
+                <a:spcPct val="25000"/>
+              </a:spcAft>
+              <a:buClr>
+                <a:schemeClr val="accent1"/>
+              </a:buClr>
+              <a:buSzPct val="50000"/>
+              <a:buFont typeface="Wingdings" pitchFamily="2" charset="2"/>
+              <a:buChar char="l"/>
+              <a:defRPr sz="2200">
+                <a:solidFill>
+                  <a:schemeClr val="tx1"/>
+                </a:solidFill>
+                <a:latin typeface="+mn-lt"/>
+              </a:defRPr>
+            </a:lvl3pPr>
+            <a:lvl4pPr marL="1281113" indent="-292100" algn="l" rtl="0" eaLnBrk="1" fontAlgn="base" hangingPunct="1">
+              <a:spcBef>
+                <a:spcPct val="20000"/>
+              </a:spcBef>
+              <a:spcAft>
+                <a:spcPct val="0"/>
+              </a:spcAft>
+              <a:buClr>
+                <a:schemeClr val="tx2"/>
+              </a:buClr>
+              <a:buSzPct val="75000"/>
+              <a:buFont typeface="Wingdings" pitchFamily="2" charset="2"/>
+              <a:buChar char="§"/>
+              <a:defRPr sz="2000">
+                <a:solidFill>
+                  <a:schemeClr val="tx1"/>
+                </a:solidFill>
+                <a:latin typeface="+mn-lt"/>
+              </a:defRPr>
+            </a:lvl4pPr>
+            <a:lvl5pPr marL="1598613" indent="-315913" algn="l" rtl="0" eaLnBrk="1" fontAlgn="base" hangingPunct="1">
+              <a:spcBef>
+                <a:spcPct val="20000"/>
+              </a:spcBef>
+              <a:spcAft>
+                <a:spcPct val="0"/>
+              </a:spcAft>
+              <a:buClr>
+                <a:schemeClr val="folHlink"/>
+              </a:buClr>
+              <a:buSzPct val="80000"/>
+              <a:buFont typeface="Wingdings" pitchFamily="2" charset="2"/>
+              <a:buChar char="§"/>
+              <a:defRPr sz="2000">
+                <a:solidFill>
+                  <a:schemeClr val="tx1"/>
+                </a:solidFill>
+                <a:latin typeface="+mn-lt"/>
+              </a:defRPr>
+            </a:lvl5pPr>
+            <a:lvl6pPr marL="2055813" indent="-315913" algn="l" rtl="0" eaLnBrk="1" fontAlgn="base" hangingPunct="1">
+              <a:spcBef>
+                <a:spcPct val="20000"/>
+              </a:spcBef>
+              <a:spcAft>
+                <a:spcPct val="0"/>
+              </a:spcAft>
+              <a:buClr>
+                <a:schemeClr val="folHlink"/>
+              </a:buClr>
+              <a:buSzPct val="80000"/>
+              <a:buFont typeface="Wingdings" pitchFamily="2" charset="2"/>
+              <a:buChar char="§"/>
+              <a:defRPr sz="2000">
+                <a:solidFill>
+                  <a:schemeClr val="tx1"/>
+                </a:solidFill>
+                <a:latin typeface="+mn-lt"/>
+              </a:defRPr>
+            </a:lvl6pPr>
+            <a:lvl7pPr marL="2513013" indent="-315913" algn="l" rtl="0" eaLnBrk="1" fontAlgn="base" hangingPunct="1">
+              <a:spcBef>
+                <a:spcPct val="20000"/>
+              </a:spcBef>
+              <a:spcAft>
+                <a:spcPct val="0"/>
+              </a:spcAft>
+              <a:buClr>
+                <a:schemeClr val="folHlink"/>
+              </a:buClr>
+              <a:buSzPct val="80000"/>
+              <a:buFont typeface="Wingdings" pitchFamily="2" charset="2"/>
+              <a:buChar char="§"/>
+              <a:defRPr sz="2000">
+                <a:solidFill>
+                  <a:schemeClr val="tx1"/>
+                </a:solidFill>
+                <a:latin typeface="+mn-lt"/>
+              </a:defRPr>
+            </a:lvl7pPr>
+            <a:lvl8pPr marL="2970213" indent="-315913" algn="l" rtl="0" eaLnBrk="1" fontAlgn="base" hangingPunct="1">
+              <a:spcBef>
+                <a:spcPct val="20000"/>
+              </a:spcBef>
+              <a:spcAft>
+                <a:spcPct val="0"/>
+              </a:spcAft>
+              <a:buClr>
+                <a:schemeClr val="folHlink"/>
+              </a:buClr>
+              <a:buSzPct val="80000"/>
+              <a:buFont typeface="Wingdings" pitchFamily="2" charset="2"/>
+              <a:buChar char="§"/>
+              <a:defRPr sz="2000">
+                <a:solidFill>
+                  <a:schemeClr val="tx1"/>
+                </a:solidFill>
+                <a:latin typeface="+mn-lt"/>
+              </a:defRPr>
+            </a:lvl8pPr>
+            <a:lvl9pPr marL="3427413" indent="-315913" algn="l" rtl="0" eaLnBrk="1" fontAlgn="base" hangingPunct="1">
+              <a:spcBef>
+                <a:spcPct val="20000"/>
+              </a:spcBef>
+              <a:spcAft>
+                <a:spcPct val="0"/>
+              </a:spcAft>
+              <a:buClr>
+                <a:schemeClr val="folHlink"/>
+              </a:buClr>
+              <a:buSzPct val="80000"/>
+              <a:buFont typeface="Wingdings" pitchFamily="2" charset="2"/>
+              <a:buChar char="§"/>
+              <a:defRPr sz="2000">
+                <a:solidFill>
+                  <a:schemeClr val="tx1"/>
+                </a:solidFill>
+                <a:latin typeface="+mn-lt"/>
+              </a:defRPr>
+            </a:lvl9pPr>
+          </a:lstStyle>
+          <a:p>
+            <a:pPr>
+              <a:buFont typeface="Wingdings" pitchFamily="2" charset="2"/>
+              <a:buChar char="v"/>
+            </a:pPr>
+            <a:r>
+              <a:rPr lang="en-US" b="1" smtClean="0">
+                <a:solidFill>
+                  <a:schemeClr val="tx2"/>
+                </a:solidFill>
+              </a:rPr>
+              <a:t>Project Revisit</a:t>
+            </a:r>
+          </a:p>
+          <a:p>
+            <a:pPr>
+              <a:buFont typeface="Wingdings" pitchFamily="2" charset="2"/>
+              <a:buChar char="v"/>
+            </a:pPr>
+            <a:r>
+              <a:rPr lang="en-US" b="1" smtClean="0">
+                <a:solidFill>
+                  <a:schemeClr val="bg1">
+                    <a:lumMod val="65000"/>
+                  </a:schemeClr>
+                </a:solidFill>
+              </a:rPr>
+              <a:t>Design &amp; Architecture</a:t>
+            </a:r>
+          </a:p>
+          <a:p>
+            <a:pPr>
+              <a:buFont typeface="Wingdings" pitchFamily="2" charset="2"/>
+              <a:buChar char="v"/>
+            </a:pPr>
+            <a:r>
+              <a:rPr lang="en-US" b="1" smtClean="0">
+                <a:solidFill>
+                  <a:schemeClr val="bg1">
+                    <a:lumMod val="65000"/>
+                  </a:schemeClr>
+                </a:solidFill>
+              </a:rPr>
+              <a:t>Detailed Design</a:t>
+            </a:r>
+          </a:p>
+          <a:p>
+            <a:pPr>
+              <a:buFont typeface="Wingdings" pitchFamily="2" charset="2"/>
+              <a:buChar char="v"/>
+            </a:pPr>
+            <a:r>
+              <a:rPr lang="en-US" b="1" smtClean="0">
+                <a:solidFill>
+                  <a:schemeClr val="bg1">
+                    <a:lumMod val="65000"/>
+                  </a:schemeClr>
+                </a:solidFill>
+              </a:rPr>
+              <a:t>Development Strategy</a:t>
+            </a:r>
+          </a:p>
+          <a:p>
+            <a:pPr>
+              <a:buFont typeface="Wingdings" pitchFamily="2" charset="2"/>
+              <a:buChar char="v"/>
+            </a:pPr>
+            <a:r>
+              <a:rPr lang="en-US" b="1" smtClean="0">
+                <a:solidFill>
+                  <a:schemeClr val="bg1">
+                    <a:lumMod val="65000"/>
+                  </a:schemeClr>
+                </a:solidFill>
+              </a:rPr>
+              <a:t>Demo of Product</a:t>
+            </a:r>
+          </a:p>
+          <a:p>
+            <a:pPr>
+              <a:buFont typeface="Wingdings" pitchFamily="2" charset="2"/>
+              <a:buChar char="v"/>
+            </a:pPr>
+            <a:r>
+              <a:rPr lang="en-US" b="1" smtClean="0">
+                <a:solidFill>
+                  <a:schemeClr val="bg1">
+                    <a:lumMod val="65000"/>
+                  </a:schemeClr>
+                </a:solidFill>
+              </a:rPr>
+              <a:t>Project Mgmt Report</a:t>
+            </a:r>
+          </a:p>
+          <a:p>
+            <a:pPr>
+              <a:buFont typeface="Wingdings" pitchFamily="2" charset="2"/>
+              <a:buChar char="v"/>
+            </a:pPr>
+            <a:r>
+              <a:rPr lang="en-US" b="1" smtClean="0">
+                <a:solidFill>
+                  <a:schemeClr val="bg1">
+                    <a:lumMod val="65000"/>
+                  </a:schemeClr>
+                </a:solidFill>
+              </a:rPr>
+              <a:t>Q &amp; A</a:t>
+            </a:r>
+            <a:endParaRPr lang="en-US" b="1" dirty="0" smtClean="0">
+              <a:solidFill>
+                <a:schemeClr val="bg1">
+                  <a:lumMod val="65000"/>
+                </a:schemeClr>
+              </a:solidFill>
+            </a:endParaRPr>
+          </a:p>
+        </p:txBody>
+      </p:sp>
     </p:spTree>
     <p:extLst>
       <p:ext uri="{BB962C8B-B14F-4D97-AF65-F5344CB8AC3E}">
-        <p14:creationId xmlns:p14="http://schemas.microsoft.com/office/powerpoint/2010/main" xmlns="" val="706440204"/>
+        <p14:creationId xmlns:p14="http://schemas.microsoft.com/office/powerpoint/2010/main" val="706440204"/>
       </p:ext>
     </p:extLst>
   </p:cSld>
@@ -24189,7 +25135,7 @@
           <a:blip r:embed="rId2" cstate="print">
             <a:extLst>
               <a:ext uri="{28A0092B-C50C-407E-A947-70E740481C1C}">
-                <a14:useLocalDpi xmlns:a14="http://schemas.microsoft.com/office/drawing/2010/main" xmlns="" val="0"/>
+                <a14:useLocalDpi xmlns:a14="http://schemas.microsoft.com/office/drawing/2010/main" val="0"/>
               </a:ext>
             </a:extLst>
           </a:blip>
@@ -24212,14 +25158,14 @@
           </a:ln>
           <a:extLst>
             <a:ext uri="{909E8E84-426E-40DD-AFC4-6F175D3DCCD1}">
-              <a14:hiddenFill xmlns:a14="http://schemas.microsoft.com/office/drawing/2010/main" xmlns="">
+              <a14:hiddenFill xmlns:a14="http://schemas.microsoft.com/office/drawing/2010/main">
                 <a:solidFill>
                   <a:srgbClr val="FFFFFF"/>
                 </a:solidFill>
               </a14:hiddenFill>
             </a:ext>
             <a:ext uri="{91240B29-F687-4F45-9708-019B960494DF}">
-              <a14:hiddenLine xmlns:a14="http://schemas.microsoft.com/office/drawing/2010/main" xmlns="" w="9525">
+              <a14:hiddenLine xmlns:a14="http://schemas.microsoft.com/office/drawing/2010/main" w="9525">
                 <a:solidFill>
                   <a:srgbClr val="000000"/>
                 </a:solidFill>
@@ -24234,7 +25180,7 @@
     </p:spTree>
     <p:extLst>
       <p:ext uri="{BB962C8B-B14F-4D97-AF65-F5344CB8AC3E}">
-        <p14:creationId xmlns:p14="http://schemas.microsoft.com/office/powerpoint/2010/main" xmlns="" val="107169001"/>
+        <p14:creationId xmlns:p14="http://schemas.microsoft.com/office/powerpoint/2010/main" val="107169001"/>
       </p:ext>
     </p:extLst>
   </p:cSld>
@@ -24333,17 +25279,8 @@
             </a:r>
             <a:r>
               <a:rPr lang="en-US" sz="2000" dirty="0" smtClean="0"/>
-              <a:t>Let </a:t>
+              <a:t>Let System Administrator to generate certificate requested by volunteers.</a:t>
             </a:r>
-            <a:r>
-              <a:rPr lang="en-US" sz="2000" dirty="0" smtClean="0"/>
-              <a:t>System Administrator to generate certificate requested by volunteers</a:t>
-            </a:r>
-            <a:r>
-              <a:rPr lang="en-US" sz="2000" dirty="0" smtClean="0"/>
-              <a:t>.</a:t>
-            </a:r>
-            <a:endParaRPr lang="en-US" sz="2000" dirty="0" smtClean="0"/>
           </a:p>
           <a:p>
             <a:r>
@@ -24366,7 +25303,7 @@
           <a:blip r:embed="rId2" cstate="print">
             <a:extLst>
               <a:ext uri="{28A0092B-C50C-407E-A947-70E740481C1C}">
-                <a14:useLocalDpi xmlns:a14="http://schemas.microsoft.com/office/drawing/2010/main" xmlns="" val="0"/>
+                <a14:useLocalDpi xmlns:a14="http://schemas.microsoft.com/office/drawing/2010/main" val="0"/>
               </a:ext>
             </a:extLst>
           </a:blip>
@@ -24389,14 +25326,14 @@
           </a:ln>
           <a:extLst>
             <a:ext uri="{909E8E84-426E-40DD-AFC4-6F175D3DCCD1}">
-              <a14:hiddenFill xmlns:a14="http://schemas.microsoft.com/office/drawing/2010/main" xmlns="">
+              <a14:hiddenFill xmlns:a14="http://schemas.microsoft.com/office/drawing/2010/main">
                 <a:solidFill>
                   <a:srgbClr val="FFFFFF"/>
                 </a:solidFill>
               </a14:hiddenFill>
             </a:ext>
             <a:ext uri="{91240B29-F687-4F45-9708-019B960494DF}">
-              <a14:hiddenLine xmlns:a14="http://schemas.microsoft.com/office/drawing/2010/main" xmlns="" w="9525">
+              <a14:hiddenLine xmlns:a14="http://schemas.microsoft.com/office/drawing/2010/main" w="9525">
                 <a:solidFill>
                   <a:srgbClr val="000000"/>
                 </a:solidFill>
@@ -24411,7 +25348,7 @@
     </p:spTree>
     <p:extLst>
       <p:ext uri="{BB962C8B-B14F-4D97-AF65-F5344CB8AC3E}">
-        <p14:creationId xmlns:p14="http://schemas.microsoft.com/office/powerpoint/2010/main" xmlns="" val="2481635434"/>
+        <p14:creationId xmlns:p14="http://schemas.microsoft.com/office/powerpoint/2010/main" val="2481635434"/>
       </p:ext>
     </p:extLst>
   </p:cSld>
@@ -24519,7 +25456,7 @@
           <a:blip r:embed="rId2" cstate="print">
             <a:extLst>
               <a:ext uri="{28A0092B-C50C-407E-A947-70E740481C1C}">
-                <a14:useLocalDpi xmlns:a14="http://schemas.microsoft.com/office/drawing/2010/main" xmlns="" val="0"/>
+                <a14:useLocalDpi xmlns:a14="http://schemas.microsoft.com/office/drawing/2010/main" val="0"/>
               </a:ext>
             </a:extLst>
           </a:blip>
@@ -24542,14 +25479,14 @@
           </a:ln>
           <a:extLst>
             <a:ext uri="{909E8E84-426E-40DD-AFC4-6F175D3DCCD1}">
-              <a14:hiddenFill xmlns:a14="http://schemas.microsoft.com/office/drawing/2010/main" xmlns="">
+              <a14:hiddenFill xmlns:a14="http://schemas.microsoft.com/office/drawing/2010/main">
                 <a:solidFill>
                   <a:srgbClr val="FFFFFF"/>
                 </a:solidFill>
               </a14:hiddenFill>
             </a:ext>
             <a:ext uri="{91240B29-F687-4F45-9708-019B960494DF}">
-              <a14:hiddenLine xmlns:a14="http://schemas.microsoft.com/office/drawing/2010/main" xmlns="" w="9525">
+              <a14:hiddenLine xmlns:a14="http://schemas.microsoft.com/office/drawing/2010/main" w="9525">
                 <a:solidFill>
                   <a:srgbClr val="000000"/>
                 </a:solidFill>
@@ -24564,7 +25501,7 @@
     </p:spTree>
     <p:extLst>
       <p:ext uri="{BB962C8B-B14F-4D97-AF65-F5344CB8AC3E}">
-        <p14:creationId xmlns:p14="http://schemas.microsoft.com/office/powerpoint/2010/main" xmlns="" val="3699847220"/>
+        <p14:creationId xmlns:p14="http://schemas.microsoft.com/office/powerpoint/2010/main" val="3699847220"/>
       </p:ext>
     </p:extLst>
   </p:cSld>
@@ -24703,7 +25640,7 @@
           <a:blip r:embed="rId2" cstate="print">
             <a:extLst>
               <a:ext uri="{28A0092B-C50C-407E-A947-70E740481C1C}">
-                <a14:useLocalDpi xmlns:a14="http://schemas.microsoft.com/office/drawing/2010/main" xmlns="" val="0"/>
+                <a14:useLocalDpi xmlns:a14="http://schemas.microsoft.com/office/drawing/2010/main" val="0"/>
               </a:ext>
             </a:extLst>
           </a:blip>
@@ -24726,14 +25663,14 @@
           </a:ln>
           <a:extLst>
             <a:ext uri="{909E8E84-426E-40DD-AFC4-6F175D3DCCD1}">
-              <a14:hiddenFill xmlns:a14="http://schemas.microsoft.com/office/drawing/2010/main" xmlns="">
+              <a14:hiddenFill xmlns:a14="http://schemas.microsoft.com/office/drawing/2010/main">
                 <a:solidFill>
                   <a:srgbClr val="FFFFFF"/>
                 </a:solidFill>
               </a14:hiddenFill>
             </a:ext>
             <a:ext uri="{91240B29-F687-4F45-9708-019B960494DF}">
-              <a14:hiddenLine xmlns:a14="http://schemas.microsoft.com/office/drawing/2010/main" xmlns="" w="9525">
+              <a14:hiddenLine xmlns:a14="http://schemas.microsoft.com/office/drawing/2010/main" w="9525">
                 <a:solidFill>
                   <a:srgbClr val="000000"/>
                 </a:solidFill>
@@ -24748,7 +25685,7 @@
     </p:spTree>
     <p:extLst>
       <p:ext uri="{BB962C8B-B14F-4D97-AF65-F5344CB8AC3E}">
-        <p14:creationId xmlns:p14="http://schemas.microsoft.com/office/powerpoint/2010/main" xmlns="" val="1219137844"/>
+        <p14:creationId xmlns:p14="http://schemas.microsoft.com/office/powerpoint/2010/main" val="1219137844"/>
       </p:ext>
     </p:extLst>
   </p:cSld>

</xml_diff>